<commit_message>
new file:   comparaison_DHT.xlsx 	modified:   "pr\303\251sentation.pptx"
</commit_message>
<xml_diff>
--- a/présentation.pptx
+++ b/présentation.pptx
@@ -5,28 +5,27 @@
     <p:sldMasterId id="2147483648" r:id="rId1"/>
   </p:sldMasterIdLst>
   <p:notesMasterIdLst>
-    <p:notesMasterId r:id="rId21"/>
+    <p:notesMasterId r:id="rId20"/>
   </p:notesMasterIdLst>
   <p:sldIdLst>
     <p:sldId id="256" r:id="rId2"/>
-    <p:sldId id="257" r:id="rId3"/>
-    <p:sldId id="261" r:id="rId4"/>
-    <p:sldId id="262" r:id="rId5"/>
-    <p:sldId id="264" r:id="rId6"/>
-    <p:sldId id="265" r:id="rId7"/>
-    <p:sldId id="258" r:id="rId8"/>
-    <p:sldId id="266" r:id="rId9"/>
-    <p:sldId id="267" r:id="rId10"/>
-    <p:sldId id="259" r:id="rId11"/>
-    <p:sldId id="268" r:id="rId12"/>
-    <p:sldId id="269" r:id="rId13"/>
-    <p:sldId id="274" r:id="rId14"/>
-    <p:sldId id="270" r:id="rId15"/>
-    <p:sldId id="260" r:id="rId16"/>
-    <p:sldId id="263" r:id="rId17"/>
-    <p:sldId id="272" r:id="rId18"/>
-    <p:sldId id="273" r:id="rId19"/>
-    <p:sldId id="271" r:id="rId20"/>
+    <p:sldId id="279" r:id="rId3"/>
+    <p:sldId id="266" r:id="rId4"/>
+    <p:sldId id="259" r:id="rId5"/>
+    <p:sldId id="268" r:id="rId6"/>
+    <p:sldId id="262" r:id="rId7"/>
+    <p:sldId id="282" r:id="rId8"/>
+    <p:sldId id="275" r:id="rId9"/>
+    <p:sldId id="269" r:id="rId10"/>
+    <p:sldId id="274" r:id="rId11"/>
+    <p:sldId id="260" r:id="rId12"/>
+    <p:sldId id="263" r:id="rId13"/>
+    <p:sldId id="272" r:id="rId14"/>
+    <p:sldId id="280" r:id="rId15"/>
+    <p:sldId id="281" r:id="rId16"/>
+    <p:sldId id="283" r:id="rId17"/>
+    <p:sldId id="277" r:id="rId18"/>
+    <p:sldId id="271" r:id="rId19"/>
   </p:sldIdLst>
   <p:sldSz cx="12192000" cy="6858000"/>
   <p:notesSz cx="6858000" cy="9144000"/>
@@ -125,6 +124,11 @@
       </a:defRPr>
     </a:lvl9pPr>
   </p:defaultTextStyle>
+  <p:extLst>
+    <p:ext uri="{EFAFB233-063F-42B5-8137-9DF3F51BA10A}">
+      <p15:sldGuideLst xmlns:p15="http://schemas.microsoft.com/office/powerpoint/2012/main"/>
+    </p:ext>
+  </p:extLst>
 </p:presentation>
 </file>
 
@@ -210,7 +214,7 @@
           <a:p>
             <a:fld id="{56FE5D87-1601-4890-AFDF-A507E492D5C7}" type="datetimeFigureOut">
               <a:rPr lang="fr-FR" smtClean="0"/>
-              <a:t>14/12/2014</a:t>
+              <a:t>17/12/2014</a:t>
             </a:fld>
             <a:endParaRPr lang="fr-FR"/>
           </a:p>
@@ -524,60 +528,12 @@
           <a:p>
             <a:r>
               <a:rPr lang="fr-FR" dirty="0" smtClean="0"/>
-              <a:t>Alice veut envoyer une information à Bob</a:t>
-            </a:r>
-          </a:p>
-          <a:p>
-            <a:endParaRPr lang="fr-FR" dirty="0" smtClean="0"/>
-          </a:p>
-          <a:p>
-            <a:r>
-              <a:rPr lang="fr-FR" dirty="0" smtClean="0"/>
-              <a:t>Alice sélectionne une clé aléatoire K et encrypte la donnée D pour obtenir le chiffré C </a:t>
-            </a:r>
-          </a:p>
-          <a:p>
-            <a:endParaRPr lang="fr-FR" dirty="0" smtClean="0"/>
-          </a:p>
-          <a:p>
-            <a:r>
-              <a:rPr lang="fr-FR" dirty="0" smtClean="0"/>
-              <a:t>Alice divise la clé en n parties K1…</a:t>
-            </a:r>
-            <a:r>
-              <a:rPr lang="fr-FR" dirty="0" err="1" smtClean="0"/>
-              <a:t>Kn</a:t>
-            </a:r>
-            <a:endParaRPr lang="fr-FR" dirty="0" smtClean="0"/>
-          </a:p>
-          <a:p>
-            <a:endParaRPr lang="fr-FR" dirty="0" smtClean="0"/>
-          </a:p>
-          <a:p>
-            <a:r>
-              <a:rPr lang="fr-FR" dirty="0" smtClean="0"/>
-              <a:t>Alice choisit une clé de localisation I et sélectionne un PNG pour obtenir n indices dans la  DHT : I1…In. </a:t>
-            </a:r>
-          </a:p>
-          <a:p>
-            <a:endParaRPr lang="fr-FR" dirty="0" smtClean="0"/>
-          </a:p>
-          <a:p>
-            <a:r>
-              <a:rPr lang="fr-FR" dirty="0" smtClean="0"/>
-              <a:t>Alice envoie les n parts de clé à ces localisations aléatoires dans la DHT</a:t>
-            </a:r>
-          </a:p>
-          <a:p>
-            <a:endParaRPr lang="fr-FR" dirty="0" smtClean="0"/>
-          </a:p>
-          <a:p>
-            <a:r>
-              <a:rPr lang="fr-FR" dirty="0" smtClean="0"/>
-              <a:t>Alice envoie un VDO (L, C, n, seuil)</a:t>
-            </a:r>
-          </a:p>
-          <a:p>
+              <a:t>Dire l’objectif,</a:t>
+            </a:r>
+            <a:r>
+              <a:rPr lang="fr-FR" baseline="0" dirty="0" smtClean="0"/>
+              <a:t> ce que l’on veut prouver directement : </a:t>
+            </a:r>
             <a:endParaRPr lang="fr-FR" dirty="0"/>
           </a:p>
         </p:txBody>
@@ -599,7 +555,7 @@
           <a:p>
             <a:fld id="{B86C6EC0-2587-492D-BA5C-73FFFD801B36}" type="slidenum">
               <a:rPr lang="fr-FR" smtClean="0"/>
-              <a:t>13</a:t>
+              <a:t>1</a:t>
             </a:fld>
             <a:endParaRPr lang="fr-FR"/>
           </a:p>
@@ -608,7 +564,7 @@
     </p:spTree>
     <p:extLst>
       <p:ext uri="{BB962C8B-B14F-4D97-AF65-F5344CB8AC3E}">
-        <p14:creationId xmlns:p14="http://schemas.microsoft.com/office/powerpoint/2010/main" val="965702319"/>
+        <p14:creationId xmlns:p14="http://schemas.microsoft.com/office/powerpoint/2010/main" val="1133219927"/>
       </p:ext>
     </p:extLst>
   </p:cSld>
@@ -662,45 +618,26 @@
           <a:bodyPr/>
           <a:lstStyle/>
           <a:p>
-            <a:r>
-              <a:rPr lang="en-US" dirty="0" smtClean="0"/>
-              <a:t> Lack of defense against Sybil attacks (where one node</a:t>
-            </a:r>
-          </a:p>
-          <a:p>
-            <a:r>
-              <a:rPr lang="en-US" dirty="0" smtClean="0"/>
-              <a:t>tries to join the DHT as many different clients</a:t>
-            </a:r>
-          </a:p>
-          <a:p>
-            <a:endParaRPr lang="en-US" dirty="0" smtClean="0"/>
-          </a:p>
-          <a:p>
-            <a:r>
-              <a:rPr lang="fr-FR" dirty="0" smtClean="0"/>
-              <a:t>Quelques changements</a:t>
-            </a:r>
-          </a:p>
-          <a:p>
             <a:pPr lvl="1"/>
             <a:r>
               <a:rPr lang="fr-FR" dirty="0" smtClean="0"/>
-              <a:t>Keys are spread over multiple key/value </a:t>
+              <a:t>Toutes les copies d’un mail </a:t>
             </a:r>
             <a:r>
               <a:rPr lang="fr-FR" dirty="0" err="1" smtClean="0"/>
-              <a:t>storage</a:t>
-            </a:r>
-            <a:r>
-              <a:rPr lang="fr-FR" dirty="0" smtClean="0"/>
-              <a:t> </a:t>
-            </a:r>
-            <a:r>
-              <a:rPr lang="fr-FR" dirty="0" err="1" smtClean="0"/>
-              <a:t>systems</a:t>
-            </a:r>
-            <a:endParaRPr lang="fr-FR" dirty="0" smtClean="0"/>
+              <a:t>ont-elles</a:t>
+            </a:r>
+            <a:r>
+              <a:rPr lang="fr-FR" dirty="0" smtClean="0"/>
+              <a:t> toutes été effacées ?</a:t>
+            </a:r>
+          </a:p>
+          <a:p>
+            <a:pPr lvl="1"/>
+            <a:r>
+              <a:rPr lang="fr-FR" dirty="0" smtClean="0"/>
+              <a:t>La destruction d’un compte Facebook n’entraîne pas celle des données</a:t>
+            </a:r>
           </a:p>
           <a:p>
             <a:endParaRPr lang="fr-FR" dirty="0"/>
@@ -724,7 +661,7 @@
           <a:p>
             <a:fld id="{B86C6EC0-2587-492D-BA5C-73FFFD801B36}" type="slidenum">
               <a:rPr lang="fr-FR" smtClean="0"/>
-              <a:t>14</a:t>
+              <a:t>3</a:t>
             </a:fld>
             <a:endParaRPr lang="fr-FR"/>
           </a:p>
@@ -733,7 +670,248 @@
     </p:spTree>
     <p:extLst>
       <p:ext uri="{BB962C8B-B14F-4D97-AF65-F5344CB8AC3E}">
-        <p14:creationId xmlns:p14="http://schemas.microsoft.com/office/powerpoint/2010/main" val="3095022413"/>
+        <p14:creationId xmlns:p14="http://schemas.microsoft.com/office/powerpoint/2010/main" val="1570164268"/>
+      </p:ext>
+    </p:extLst>
+  </p:cSld>
+  <p:clrMapOvr>
+    <a:masterClrMapping/>
+  </p:clrMapOvr>
+</p:notes>
+</file>
+
+<file path=ppt/notesSlides/notesSlide3.xml><?xml version="1.0" encoding="utf-8"?>
+<p:notes xmlns:a="http://schemas.openxmlformats.org/drawingml/2006/main" xmlns:r="http://schemas.openxmlformats.org/officeDocument/2006/relationships" xmlns:p="http://schemas.openxmlformats.org/presentationml/2006/main">
+  <p:cSld>
+    <p:spTree>
+      <p:nvGrpSpPr>
+        <p:cNvPr id="1" name=""/>
+        <p:cNvGrpSpPr/>
+        <p:nvPr/>
+      </p:nvGrpSpPr>
+      <p:grpSpPr>
+        <a:xfrm>
+          <a:off x="0" y="0"/>
+          <a:ext cx="0" cy="0"/>
+          <a:chOff x="0" y="0"/>
+          <a:chExt cx="0" cy="0"/>
+        </a:xfrm>
+      </p:grpSpPr>
+      <p:sp>
+        <p:nvSpPr>
+          <p:cNvPr id="2" name="Espace réservé de l'image des diapositives 1"/>
+          <p:cNvSpPr>
+            <a:spLocks noGrp="1" noRot="1" noChangeAspect="1"/>
+          </p:cNvSpPr>
+          <p:nvPr>
+            <p:ph type="sldImg"/>
+          </p:nvPr>
+        </p:nvSpPr>
+        <p:spPr/>
+      </p:sp>
+      <p:sp>
+        <p:nvSpPr>
+          <p:cNvPr id="3" name="Espace réservé des commentaires 2"/>
+          <p:cNvSpPr>
+            <a:spLocks noGrp="1"/>
+          </p:cNvSpPr>
+          <p:nvPr>
+            <p:ph type="body" idx="1"/>
+          </p:nvPr>
+        </p:nvSpPr>
+        <p:spPr/>
+        <p:txBody>
+          <a:bodyPr/>
+          <a:lstStyle/>
+          <a:p>
+            <a:pPr marL="0" marR="0" indent="0" algn="l" defTabSz="914400" rtl="0" eaLnBrk="1" fontAlgn="auto" latinLnBrk="0" hangingPunct="1">
+              <a:lnSpc>
+                <a:spcPct val="100000"/>
+              </a:lnSpc>
+              <a:spcBef>
+                <a:spcPts val="0"/>
+              </a:spcBef>
+              <a:spcAft>
+                <a:spcPts val="0"/>
+              </a:spcAft>
+              <a:buClrTx/>
+              <a:buSzTx/>
+              <a:buFontTx/>
+              <a:buNone/>
+              <a:tabLst/>
+              <a:defRPr/>
+            </a:pPr>
+            <a:endParaRPr lang="fr-FR" dirty="0"/>
+          </a:p>
+        </p:txBody>
+      </p:sp>
+      <p:sp>
+        <p:nvSpPr>
+          <p:cNvPr id="4" name="Espace réservé du numéro de diapositive 3"/>
+          <p:cNvSpPr>
+            <a:spLocks noGrp="1"/>
+          </p:cNvSpPr>
+          <p:nvPr>
+            <p:ph type="sldNum" sz="quarter" idx="10"/>
+          </p:nvPr>
+        </p:nvSpPr>
+        <p:spPr/>
+        <p:txBody>
+          <a:bodyPr/>
+          <a:lstStyle/>
+          <a:p>
+            <a:fld id="{B86C6EC0-2587-492D-BA5C-73FFFD801B36}" type="slidenum">
+              <a:rPr lang="fr-FR" smtClean="0"/>
+              <a:t>7</a:t>
+            </a:fld>
+            <a:endParaRPr lang="fr-FR"/>
+          </a:p>
+        </p:txBody>
+      </p:sp>
+    </p:spTree>
+    <p:extLst>
+      <p:ext uri="{BB962C8B-B14F-4D97-AF65-F5344CB8AC3E}">
+        <p14:creationId xmlns:p14="http://schemas.microsoft.com/office/powerpoint/2010/main" val="214322809"/>
+      </p:ext>
+    </p:extLst>
+  </p:cSld>
+  <p:clrMapOvr>
+    <a:masterClrMapping/>
+  </p:clrMapOvr>
+</p:notes>
+</file>
+
+<file path=ppt/notesSlides/notesSlide4.xml><?xml version="1.0" encoding="utf-8"?>
+<p:notes xmlns:a="http://schemas.openxmlformats.org/drawingml/2006/main" xmlns:r="http://schemas.openxmlformats.org/officeDocument/2006/relationships" xmlns:p="http://schemas.openxmlformats.org/presentationml/2006/main">
+  <p:cSld>
+    <p:spTree>
+      <p:nvGrpSpPr>
+        <p:cNvPr id="1" name=""/>
+        <p:cNvGrpSpPr/>
+        <p:nvPr/>
+      </p:nvGrpSpPr>
+      <p:grpSpPr>
+        <a:xfrm>
+          <a:off x="0" y="0"/>
+          <a:ext cx="0" cy="0"/>
+          <a:chOff x="0" y="0"/>
+          <a:chExt cx="0" cy="0"/>
+        </a:xfrm>
+      </p:grpSpPr>
+      <p:sp>
+        <p:nvSpPr>
+          <p:cNvPr id="2" name="Espace réservé de l'image des diapositives 1"/>
+          <p:cNvSpPr>
+            <a:spLocks noGrp="1" noRot="1" noChangeAspect="1"/>
+          </p:cNvSpPr>
+          <p:nvPr>
+            <p:ph type="sldImg"/>
+          </p:nvPr>
+        </p:nvSpPr>
+        <p:spPr/>
+      </p:sp>
+      <p:sp>
+        <p:nvSpPr>
+          <p:cNvPr id="3" name="Espace réservé des commentaires 2"/>
+          <p:cNvSpPr>
+            <a:spLocks noGrp="1"/>
+          </p:cNvSpPr>
+          <p:nvPr>
+            <p:ph type="body" idx="1"/>
+          </p:nvPr>
+        </p:nvSpPr>
+        <p:spPr/>
+        <p:txBody>
+          <a:bodyPr/>
+          <a:lstStyle/>
+          <a:p>
+            <a:r>
+              <a:rPr lang="fr-FR" dirty="0" smtClean="0"/>
+              <a:t>Alice veut envoyer une information à Bob</a:t>
+            </a:r>
+          </a:p>
+          <a:p>
+            <a:endParaRPr lang="fr-FR" dirty="0" smtClean="0"/>
+          </a:p>
+          <a:p>
+            <a:r>
+              <a:rPr lang="fr-FR" dirty="0" smtClean="0"/>
+              <a:t>Alice sélectionne une clé aléatoire K et encrypte la donnée D pour obtenir le chiffré C </a:t>
+            </a:r>
+          </a:p>
+          <a:p>
+            <a:endParaRPr lang="fr-FR" dirty="0" smtClean="0"/>
+          </a:p>
+          <a:p>
+            <a:r>
+              <a:rPr lang="fr-FR" dirty="0" smtClean="0"/>
+              <a:t>Alice divise la clé en n parties K1…</a:t>
+            </a:r>
+            <a:r>
+              <a:rPr lang="fr-FR" dirty="0" err="1" smtClean="0"/>
+              <a:t>Kn</a:t>
+            </a:r>
+            <a:endParaRPr lang="fr-FR" dirty="0" smtClean="0"/>
+          </a:p>
+          <a:p>
+            <a:endParaRPr lang="fr-FR" dirty="0" smtClean="0"/>
+          </a:p>
+          <a:p>
+            <a:r>
+              <a:rPr lang="fr-FR" dirty="0" smtClean="0"/>
+              <a:t>Alice choisit une clé de localisation I et sélectionne un PNG pour obtenir n indices dans la  DHT : I1…In. </a:t>
+            </a:r>
+          </a:p>
+          <a:p>
+            <a:endParaRPr lang="fr-FR" dirty="0" smtClean="0"/>
+          </a:p>
+          <a:p>
+            <a:r>
+              <a:rPr lang="fr-FR" dirty="0" smtClean="0"/>
+              <a:t>Alice envoie les n parts de clé à ces localisations aléatoires dans la DHT</a:t>
+            </a:r>
+          </a:p>
+          <a:p>
+            <a:endParaRPr lang="fr-FR" dirty="0" smtClean="0"/>
+          </a:p>
+          <a:p>
+            <a:r>
+              <a:rPr lang="fr-FR" dirty="0" smtClean="0"/>
+              <a:t>Alice envoie un VDO (L, C, n, seuil)</a:t>
+            </a:r>
+          </a:p>
+          <a:p>
+            <a:endParaRPr lang="fr-FR" dirty="0"/>
+          </a:p>
+        </p:txBody>
+      </p:sp>
+      <p:sp>
+        <p:nvSpPr>
+          <p:cNvPr id="4" name="Espace réservé du numéro de diapositive 3"/>
+          <p:cNvSpPr>
+            <a:spLocks noGrp="1"/>
+          </p:cNvSpPr>
+          <p:nvPr>
+            <p:ph type="sldNum" sz="quarter" idx="10"/>
+          </p:nvPr>
+        </p:nvSpPr>
+        <p:spPr/>
+        <p:txBody>
+          <a:bodyPr/>
+          <a:lstStyle/>
+          <a:p>
+            <a:fld id="{B86C6EC0-2587-492D-BA5C-73FFFD801B36}" type="slidenum">
+              <a:rPr lang="fr-FR" smtClean="0"/>
+              <a:t>10</a:t>
+            </a:fld>
+            <a:endParaRPr lang="fr-FR"/>
+          </a:p>
+        </p:txBody>
+      </p:sp>
+    </p:spTree>
+    <p:extLst>
+      <p:ext uri="{BB962C8B-B14F-4D97-AF65-F5344CB8AC3E}">
+        <p14:creationId xmlns:p14="http://schemas.microsoft.com/office/powerpoint/2010/main" val="965702319"/>
       </p:ext>
     </p:extLst>
   </p:cSld>
@@ -872,9 +1050,9 @@
           <a:bodyPr/>
           <a:lstStyle/>
           <a:p>
-            <a:fld id="{F4790E31-8FEC-4C78-8147-09C5D28DDF34}" type="datetimeFigureOut">
-              <a:rPr lang="fr-FR" smtClean="0"/>
-              <a:t>14/12/2014</a:t>
+            <a:fld id="{191EAE5F-BFBC-498D-B1F7-6F801FB6A6F9}" type="datetime1">
+              <a:rPr lang="fr-FR" smtClean="0"/>
+              <a:t>17/12/2014</a:t>
             </a:fld>
             <a:endParaRPr lang="fr-FR"/>
           </a:p>
@@ -1042,9 +1220,9 @@
           <a:bodyPr/>
           <a:lstStyle/>
           <a:p>
-            <a:fld id="{F4790E31-8FEC-4C78-8147-09C5D28DDF34}" type="datetimeFigureOut">
-              <a:rPr lang="fr-FR" smtClean="0"/>
-              <a:t>14/12/2014</a:t>
+            <a:fld id="{A79905C4-6FFE-4383-B742-67B16467889D}" type="datetime1">
+              <a:rPr lang="fr-FR" smtClean="0"/>
+              <a:t>17/12/2014</a:t>
             </a:fld>
             <a:endParaRPr lang="fr-FR"/>
           </a:p>
@@ -1222,9 +1400,9 @@
           <a:bodyPr/>
           <a:lstStyle/>
           <a:p>
-            <a:fld id="{F4790E31-8FEC-4C78-8147-09C5D28DDF34}" type="datetimeFigureOut">
-              <a:rPr lang="fr-FR" smtClean="0"/>
-              <a:t>14/12/2014</a:t>
+            <a:fld id="{83755001-BFE9-4EB4-8E7F-AF6980B9CEAD}" type="datetime1">
+              <a:rPr lang="fr-FR" smtClean="0"/>
+              <a:t>17/12/2014</a:t>
             </a:fld>
             <a:endParaRPr lang="fr-FR"/>
           </a:p>
@@ -1392,9 +1570,9 @@
           <a:bodyPr/>
           <a:lstStyle/>
           <a:p>
-            <a:fld id="{F4790E31-8FEC-4C78-8147-09C5D28DDF34}" type="datetimeFigureOut">
-              <a:rPr lang="fr-FR" smtClean="0"/>
-              <a:t>14/12/2014</a:t>
+            <a:fld id="{5F1BA976-03E1-4F46-83F9-7ADA96E30A4C}" type="datetime1">
+              <a:rPr lang="fr-FR" smtClean="0"/>
+              <a:t>17/12/2014</a:t>
             </a:fld>
             <a:endParaRPr lang="fr-FR"/>
           </a:p>
@@ -1638,9 +1816,9 @@
           <a:bodyPr/>
           <a:lstStyle/>
           <a:p>
-            <a:fld id="{F4790E31-8FEC-4C78-8147-09C5D28DDF34}" type="datetimeFigureOut">
-              <a:rPr lang="fr-FR" smtClean="0"/>
-              <a:t>14/12/2014</a:t>
+            <a:fld id="{8C12CDA6-01A6-4124-A5DA-371DC49D7533}" type="datetime1">
+              <a:rPr lang="fr-FR" smtClean="0"/>
+              <a:t>17/12/2014</a:t>
             </a:fld>
             <a:endParaRPr lang="fr-FR"/>
           </a:p>
@@ -1870,9 +2048,9 @@
           <a:bodyPr/>
           <a:lstStyle/>
           <a:p>
-            <a:fld id="{F4790E31-8FEC-4C78-8147-09C5D28DDF34}" type="datetimeFigureOut">
-              <a:rPr lang="fr-FR" smtClean="0"/>
-              <a:t>14/12/2014</a:t>
+            <a:fld id="{729CA445-3FF2-4701-B843-18238C7501C3}" type="datetime1">
+              <a:rPr lang="fr-FR" smtClean="0"/>
+              <a:t>17/12/2014</a:t>
             </a:fld>
             <a:endParaRPr lang="fr-FR"/>
           </a:p>
@@ -2237,9 +2415,9 @@
           <a:bodyPr/>
           <a:lstStyle/>
           <a:p>
-            <a:fld id="{F4790E31-8FEC-4C78-8147-09C5D28DDF34}" type="datetimeFigureOut">
-              <a:rPr lang="fr-FR" smtClean="0"/>
-              <a:t>14/12/2014</a:t>
+            <a:fld id="{F11F099B-2392-46A9-96E8-BEDB097DB0E2}" type="datetime1">
+              <a:rPr lang="fr-FR" smtClean="0"/>
+              <a:t>17/12/2014</a:t>
             </a:fld>
             <a:endParaRPr lang="fr-FR"/>
           </a:p>
@@ -2355,9 +2533,9 @@
           <a:bodyPr/>
           <a:lstStyle/>
           <a:p>
-            <a:fld id="{F4790E31-8FEC-4C78-8147-09C5D28DDF34}" type="datetimeFigureOut">
-              <a:rPr lang="fr-FR" smtClean="0"/>
-              <a:t>14/12/2014</a:t>
+            <a:fld id="{5796C659-1D7D-49BA-82B9-D51F2EBB18C1}" type="datetime1">
+              <a:rPr lang="fr-FR" smtClean="0"/>
+              <a:t>17/12/2014</a:t>
             </a:fld>
             <a:endParaRPr lang="fr-FR"/>
           </a:p>
@@ -2450,9 +2628,9 @@
           <a:bodyPr/>
           <a:lstStyle/>
           <a:p>
-            <a:fld id="{F4790E31-8FEC-4C78-8147-09C5D28DDF34}" type="datetimeFigureOut">
-              <a:rPr lang="fr-FR" smtClean="0"/>
-              <a:t>14/12/2014</a:t>
+            <a:fld id="{B44FCC33-35E5-48B6-85E8-7E8A2E8E544B}" type="datetime1">
+              <a:rPr lang="fr-FR" smtClean="0"/>
+              <a:t>17/12/2014</a:t>
             </a:fld>
             <a:endParaRPr lang="fr-FR"/>
           </a:p>
@@ -2727,9 +2905,9 @@
           <a:bodyPr/>
           <a:lstStyle/>
           <a:p>
-            <a:fld id="{F4790E31-8FEC-4C78-8147-09C5D28DDF34}" type="datetimeFigureOut">
-              <a:rPr lang="fr-FR" smtClean="0"/>
-              <a:t>14/12/2014</a:t>
+            <a:fld id="{A6A9D4EB-FBDF-4A14-B397-6B709D065F61}" type="datetime1">
+              <a:rPr lang="fr-FR" smtClean="0"/>
+              <a:t>17/12/2014</a:t>
             </a:fld>
             <a:endParaRPr lang="fr-FR"/>
           </a:p>
@@ -2980,9 +3158,9 @@
           <a:bodyPr/>
           <a:lstStyle/>
           <a:p>
-            <a:fld id="{F4790E31-8FEC-4C78-8147-09C5D28DDF34}" type="datetimeFigureOut">
-              <a:rPr lang="fr-FR" smtClean="0"/>
-              <a:t>14/12/2014</a:t>
+            <a:fld id="{FBE6395C-7482-494C-B080-7C94E825CE8C}" type="datetime1">
+              <a:rPr lang="fr-FR" smtClean="0"/>
+              <a:t>17/12/2014</a:t>
             </a:fld>
             <a:endParaRPr lang="fr-FR"/>
           </a:p>
@@ -3193,9 +3371,9 @@
             </a:lvl1pPr>
           </a:lstStyle>
           <a:p>
-            <a:fld id="{F4790E31-8FEC-4C78-8147-09C5D28DDF34}" type="datetimeFigureOut">
-              <a:rPr lang="fr-FR" smtClean="0"/>
-              <a:t>14/12/2014</a:t>
+            <a:fld id="{CFD5C1AC-1A75-4908-9C55-B73054550F06}" type="datetime1">
+              <a:rPr lang="fr-FR" smtClean="0"/>
+              <a:t>17/12/2014</a:t>
             </a:fld>
             <a:endParaRPr lang="fr-FR"/>
           </a:p>
@@ -3300,6 +3478,7 @@
     <p:sldLayoutId id="2147483658" r:id="rId10"/>
     <p:sldLayoutId id="2147483659" r:id="rId11"/>
   </p:sldLayoutIdLst>
+  <p:hf hdr="0" ftr="0" dt="0"/>
   <p:txStyles>
     <p:titleStyle>
       <a:lvl1pPr algn="l" defTabSz="914400" rtl="0" eaLnBrk="1" latinLnBrk="0" hangingPunct="1">
@@ -3612,11 +3791,54 @@
         </p:nvSpPr>
         <p:spPr/>
         <p:txBody>
-          <a:bodyPr/>
-          <a:lstStyle/>
-          <a:p>
-            <a:r>
-              <a:rPr lang="fr-FR" dirty="0" smtClean="0"/>
+          <a:bodyPr>
+            <a:normAutofit fontScale="90000"/>
+          </a:bodyPr>
+          <a:lstStyle/>
+          <a:p>
+            <a:r>
+              <a:rPr lang="fr-FR" dirty="0" smtClean="0"/>
+              <a:t>Implémentation</a:t>
+            </a:r>
+            <a:br>
+              <a:rPr lang="fr-FR" dirty="0" smtClean="0"/>
+            </a:br>
+            <a:r>
+              <a:rPr lang="fr-FR" sz="4900" dirty="0" smtClean="0"/>
+              <a:t>du </a:t>
+            </a:r>
+            <a:r>
+              <a:rPr lang="fr-FR" dirty="0" smtClean="0"/>
+              <a:t/>
+            </a:r>
+            <a:br>
+              <a:rPr lang="fr-FR" dirty="0" smtClean="0"/>
+            </a:br>
+            <a:r>
+              <a:rPr lang="fr-FR" dirty="0" smtClean="0"/>
+              <a:t>Droit à l’Oubli</a:t>
+            </a:r>
+            <a:endParaRPr lang="fr-FR" dirty="0"/>
+          </a:p>
+        </p:txBody>
+      </p:sp>
+      <p:sp>
+        <p:nvSpPr>
+          <p:cNvPr id="3" name="Sous-titre 2"/>
+          <p:cNvSpPr>
+            <a:spLocks noGrp="1"/>
+          </p:cNvSpPr>
+          <p:nvPr>
+            <p:ph type="subTitle" idx="1"/>
+          </p:nvPr>
+        </p:nvSpPr>
+        <p:spPr/>
+        <p:txBody>
+          <a:bodyPr/>
+          <a:lstStyle/>
+          <a:p>
+            <a:r>
+              <a:rPr lang="fr-FR" dirty="0"/>
               <a:t>Publication éphémère et dégradation de données</a:t>
             </a:r>
             <a:endParaRPr lang="fr-FR" dirty="0"/>
@@ -3625,24 +3847,24 @@
       </p:sp>
       <p:sp>
         <p:nvSpPr>
-          <p:cNvPr id="3" name="Sous-titre 2"/>
-          <p:cNvSpPr>
-            <a:spLocks noGrp="1"/>
-          </p:cNvSpPr>
-          <p:nvPr>
-            <p:ph type="subTitle" idx="1"/>
-          </p:nvPr>
-        </p:nvSpPr>
-        <p:spPr/>
-        <p:txBody>
-          <a:bodyPr/>
-          <a:lstStyle/>
-          <a:p>
-            <a:r>
-              <a:rPr lang="fr-FR" dirty="0" smtClean="0"/>
-              <a:t>Application à la géolocalisation</a:t>
-            </a:r>
-            <a:endParaRPr lang="fr-FR" dirty="0"/>
+          <p:cNvPr id="5" name="Espace réservé du numéro de diapositive 4"/>
+          <p:cNvSpPr>
+            <a:spLocks noGrp="1"/>
+          </p:cNvSpPr>
+          <p:nvPr>
+            <p:ph type="sldNum" sz="quarter" idx="12"/>
+          </p:nvPr>
+        </p:nvSpPr>
+        <p:spPr/>
+        <p:txBody>
+          <a:bodyPr/>
+          <a:lstStyle/>
+          <a:p>
+            <a:fld id="{36A212DA-347D-4853-A3E5-DB8AA592974E}" type="slidenum">
+              <a:rPr lang="fr-FR" smtClean="0"/>
+              <a:t>1</a:t>
+            </a:fld>
+            <a:endParaRPr lang="fr-FR"/>
           </a:p>
         </p:txBody>
       </p:sp>
@@ -3693,27 +3915,95 @@
           <a:p>
             <a:r>
               <a:rPr lang="fr-FR" dirty="0" smtClean="0"/>
-              <a:t>Une solution : la publication éphémère</a:t>
+              <a:t>Illustration</a:t>
             </a:r>
             <a:endParaRPr lang="fr-FR" dirty="0"/>
           </a:p>
         </p:txBody>
       </p:sp>
-      <p:sp>
-        <p:nvSpPr>
-          <p:cNvPr id="3" name="Espace réservé du texte 2"/>
-          <p:cNvSpPr>
-            <a:spLocks noGrp="1"/>
-          </p:cNvSpPr>
-          <p:nvPr>
-            <p:ph type="body" idx="1"/>
-          </p:nvPr>
-        </p:nvSpPr>
-        <p:spPr/>
-        <p:txBody>
-          <a:bodyPr/>
-          <a:lstStyle/>
-          <a:p>
+      <p:pic>
+        <p:nvPicPr>
+          <p:cNvPr id="4" name="Espace réservé du contenu 3"/>
+          <p:cNvPicPr>
+            <a:picLocks noGrp="1" noChangeAspect="1"/>
+          </p:cNvPicPr>
+          <p:nvPr>
+            <p:ph idx="1"/>
+          </p:nvPr>
+        </p:nvPicPr>
+        <p:blipFill>
+          <a:blip r:embed="rId3"/>
+          <a:stretch>
+            <a:fillRect/>
+          </a:stretch>
+        </p:blipFill>
+        <p:spPr>
+          <a:xfrm>
+            <a:off x="1151568" y="1690688"/>
+            <a:ext cx="9888864" cy="3543070"/>
+          </a:xfrm>
+          <a:prstGeom prst="rect">
+            <a:avLst/>
+          </a:prstGeom>
+        </p:spPr>
+      </p:pic>
+      <p:sp>
+        <p:nvSpPr>
+          <p:cNvPr id="5" name="ZoneTexte 4"/>
+          <p:cNvSpPr txBox="1"/>
+          <p:nvPr/>
+        </p:nvSpPr>
+        <p:spPr>
+          <a:xfrm>
+            <a:off x="0" y="0"/>
+            <a:ext cx="4944752" cy="369332"/>
+          </a:xfrm>
+          <a:prstGeom prst="rect">
+            <a:avLst/>
+          </a:prstGeom>
+          <a:noFill/>
+        </p:spPr>
+        <p:txBody>
+          <a:bodyPr wrap="none" rtlCol="0">
+            <a:spAutoFit/>
+          </a:bodyPr>
+          <a:lstStyle/>
+          <a:p>
+            <a:r>
+              <a:rPr lang="fr-FR" dirty="0" smtClean="0"/>
+              <a:t>Exposé du problème -&gt; </a:t>
+            </a:r>
+            <a:r>
+              <a:rPr lang="fr-FR" b="1" dirty="0" smtClean="0"/>
+              <a:t>Solution</a:t>
+            </a:r>
+            <a:r>
+              <a:rPr lang="fr-FR" dirty="0" smtClean="0"/>
+              <a:t> -&gt; Notre approche</a:t>
+            </a:r>
+            <a:endParaRPr lang="fr-FR" dirty="0"/>
+          </a:p>
+        </p:txBody>
+      </p:sp>
+      <p:sp>
+        <p:nvSpPr>
+          <p:cNvPr id="6" name="Espace réservé du numéro de diapositive 5"/>
+          <p:cNvSpPr>
+            <a:spLocks noGrp="1"/>
+          </p:cNvSpPr>
+          <p:nvPr>
+            <p:ph type="sldNum" sz="quarter" idx="12"/>
+          </p:nvPr>
+        </p:nvSpPr>
+        <p:spPr/>
+        <p:txBody>
+          <a:bodyPr/>
+          <a:lstStyle/>
+          <a:p>
+            <a:fld id="{36A212DA-347D-4853-A3E5-DB8AA592974E}" type="slidenum">
+              <a:rPr lang="fr-FR" smtClean="0"/>
+              <a:t>10</a:t>
+            </a:fld>
             <a:endParaRPr lang="fr-FR"/>
           </a:p>
         </p:txBody>
@@ -3721,7 +4011,7 @@
     </p:spTree>
     <p:extLst>
       <p:ext uri="{BB962C8B-B14F-4D97-AF65-F5344CB8AC3E}">
-        <p14:creationId xmlns:p14="http://schemas.microsoft.com/office/powerpoint/2010/main" val="338398204"/>
+        <p14:creationId xmlns:p14="http://schemas.microsoft.com/office/powerpoint/2010/main" val="1116215067"/>
       </p:ext>
     </p:extLst>
   </p:cSld>
@@ -3765,7 +4055,7 @@
           <a:p>
             <a:r>
               <a:rPr lang="fr-FR" dirty="0" smtClean="0"/>
-              <a:t>Objectif</a:t>
+              <a:t>Notre approche : application à la dégradation de données de géolocalisation</a:t>
             </a:r>
             <a:endParaRPr lang="fr-FR" dirty="0"/>
           </a:p>
@@ -3773,74 +4063,50 @@
       </p:sp>
       <p:sp>
         <p:nvSpPr>
-          <p:cNvPr id="3" name="Espace réservé du contenu 2"/>
-          <p:cNvSpPr>
-            <a:spLocks noGrp="1"/>
-          </p:cNvSpPr>
-          <p:nvPr>
-            <p:ph idx="1"/>
-          </p:nvPr>
-        </p:nvSpPr>
-        <p:spPr/>
-        <p:txBody>
-          <a:bodyPr>
-            <a:normAutofit/>
-          </a:bodyPr>
-          <a:lstStyle/>
-          <a:p>
-            <a:r>
-              <a:rPr lang="fr-FR" dirty="0" smtClean="0"/>
-              <a:t>Donner à l’utilisateur le contrôle sur la durée de vie de ses données</a:t>
-            </a:r>
-          </a:p>
-          <a:p>
-            <a:pPr lvl="1"/>
-            <a:endParaRPr lang="fr-FR" dirty="0" smtClean="0"/>
-          </a:p>
-          <a:p>
-            <a:r>
-              <a:rPr lang="fr-FR" dirty="0" smtClean="0"/>
-              <a:t>Après un laps de temps, toutes les copies de la données dont illisibles</a:t>
-            </a:r>
-          </a:p>
-          <a:p>
-            <a:pPr lvl="1"/>
-            <a:r>
-              <a:rPr lang="fr-FR" dirty="0" smtClean="0"/>
-              <a:t>Copies en ligne ou téléchargées</a:t>
-            </a:r>
-          </a:p>
-          <a:p>
-            <a:pPr lvl="1"/>
-            <a:r>
-              <a:rPr lang="fr-FR" dirty="0" smtClean="0"/>
-              <a:t>Aucune action explicite de l’utilisateur</a:t>
-            </a:r>
-          </a:p>
-          <a:p>
-            <a:pPr lvl="1"/>
-            <a:r>
-              <a:rPr lang="fr-FR" dirty="0" smtClean="0"/>
-              <a:t>Aucun contrôle centralisé</a:t>
-            </a:r>
-          </a:p>
-          <a:p>
-            <a:pPr lvl="1"/>
-            <a:r>
-              <a:rPr lang="fr-FR" dirty="0" smtClean="0">
-                <a:solidFill>
-                  <a:srgbClr val="FF0000"/>
-                </a:solidFill>
-              </a:rPr>
-              <a:t>Même pour un attaquant qui obtiendrait une copie chiffrée et la clé correspondante</a:t>
-            </a:r>
+          <p:cNvPr id="3" name="Espace réservé du texte 2"/>
+          <p:cNvSpPr>
+            <a:spLocks noGrp="1"/>
+          </p:cNvSpPr>
+          <p:nvPr>
+            <p:ph type="body" idx="1"/>
+          </p:nvPr>
+        </p:nvSpPr>
+        <p:spPr/>
+        <p:txBody>
+          <a:bodyPr/>
+          <a:lstStyle/>
+          <a:p>
+            <a:endParaRPr lang="fr-FR"/>
+          </a:p>
+        </p:txBody>
+      </p:sp>
+      <p:sp>
+        <p:nvSpPr>
+          <p:cNvPr id="5" name="Espace réservé du numéro de diapositive 4"/>
+          <p:cNvSpPr>
+            <a:spLocks noGrp="1"/>
+          </p:cNvSpPr>
+          <p:nvPr>
+            <p:ph type="sldNum" sz="quarter" idx="12"/>
+          </p:nvPr>
+        </p:nvSpPr>
+        <p:spPr/>
+        <p:txBody>
+          <a:bodyPr/>
+          <a:lstStyle/>
+          <a:p>
+            <a:fld id="{36A212DA-347D-4853-A3E5-DB8AA592974E}" type="slidenum">
+              <a:rPr lang="fr-FR" smtClean="0"/>
+              <a:t>11</a:t>
+            </a:fld>
+            <a:endParaRPr lang="fr-FR"/>
           </a:p>
         </p:txBody>
       </p:sp>
     </p:spTree>
     <p:extLst>
       <p:ext uri="{BB962C8B-B14F-4D97-AF65-F5344CB8AC3E}">
-        <p14:creationId xmlns:p14="http://schemas.microsoft.com/office/powerpoint/2010/main" val="2882096277"/>
+        <p14:creationId xmlns:p14="http://schemas.microsoft.com/office/powerpoint/2010/main" val="2936282269"/>
       </p:ext>
     </p:extLst>
   </p:cSld>
@@ -3884,7 +4150,7 @@
           <a:p>
             <a:r>
               <a:rPr lang="fr-FR" dirty="0" smtClean="0"/>
-              <a:t>Moyen : DHT</a:t>
+              <a:t>Objectifs</a:t>
             </a:r>
             <a:endParaRPr lang="fr-FR" dirty="0"/>
           </a:p>
@@ -3903,60 +4169,147 @@
         <p:spPr/>
         <p:txBody>
           <a:bodyPr>
-            <a:normAutofit/>
+            <a:normAutofit fontScale="92500" lnSpcReduction="10000"/>
           </a:bodyPr>
           <a:lstStyle/>
           <a:p>
-            <a:r>
-              <a:rPr lang="fr-FR" dirty="0" smtClean="0"/>
-              <a:t>Les morceaux de clé sont envoyés sur la DHT</a:t>
-            </a:r>
-          </a:p>
-          <a:p>
-            <a:r>
-              <a:rPr lang="fr-FR" dirty="0" smtClean="0"/>
-              <a:t>Les données chiffrées et une clé de localisation sont transmises aux utilisateurs légitimes</a:t>
-            </a:r>
-          </a:p>
-          <a:p>
+            <a:endParaRPr lang="fr-FR" dirty="0" smtClean="0"/>
+          </a:p>
+          <a:p>
+            <a:r>
+              <a:rPr lang="fr-FR" dirty="0" smtClean="0"/>
+              <a:t>Comme précédemment : disparition des données mais… progressive !</a:t>
+            </a:r>
+          </a:p>
+          <a:p>
+            <a:endParaRPr lang="fr-FR" dirty="0" smtClean="0"/>
+          </a:p>
+          <a:p>
+            <a:r>
+              <a:rPr lang="fr-FR" dirty="0" smtClean="0"/>
+              <a:t>Un nouveau principe : la dégradation de données</a:t>
+            </a:r>
+          </a:p>
+          <a:p>
+            <a:pPr lvl="1"/>
+            <a:r>
+              <a:rPr lang="fr-FR" dirty="0" smtClean="0"/>
+              <a:t>Plusieurs états de la données, de moins en moins précis</a:t>
+            </a:r>
+          </a:p>
+          <a:p>
+            <a:pPr lvl="1"/>
+            <a:r>
+              <a:rPr lang="fr-FR" dirty="0" smtClean="0"/>
+              <a:t>Découle d’un nouveau modèle </a:t>
+            </a:r>
+            <a:r>
+              <a:rPr lang="fr-FR" dirty="0"/>
+              <a:t>économique de la valeur d’une </a:t>
+            </a:r>
+            <a:r>
+              <a:rPr lang="fr-FR" dirty="0" smtClean="0"/>
+              <a:t>donnée (2009)</a:t>
+            </a:r>
             <a:endParaRPr lang="fr-FR" dirty="0"/>
           </a:p>
           <a:p>
-            <a:r>
-              <a:rPr lang="fr-FR" dirty="0" smtClean="0"/>
-              <a:t>La DHT oublie les clés avec le temps</a:t>
+            <a:endParaRPr lang="fr-FR" dirty="0" smtClean="0"/>
+          </a:p>
+          <a:p>
+            <a:r>
+              <a:rPr lang="fr-FR" dirty="0" smtClean="0"/>
+              <a:t>Exemples</a:t>
             </a:r>
           </a:p>
           <a:p>
             <a:pPr lvl="1"/>
             <a:r>
               <a:rPr lang="fr-FR" dirty="0" smtClean="0"/>
-              <a:t>Attrition naturelle: les nœuds crashent ou quittent la DHT</a:t>
+              <a:t>Point GPS -&gt; rectangle</a:t>
             </a:r>
           </a:p>
           <a:p>
             <a:pPr lvl="1"/>
             <a:r>
               <a:rPr lang="fr-FR" dirty="0" smtClean="0"/>
-              <a:t>Timeout : les nœuds purgent leurs données périodiquement</a:t>
+              <a:t>Minute -&gt; semaine</a:t>
+            </a:r>
+          </a:p>
+          <a:p>
+            <a:pPr lvl="1"/>
+            <a:r>
+              <a:rPr lang="fr-FR" dirty="0" smtClean="0"/>
+              <a:t>Le dragon du bonheur -&gt; restaurant chinois</a:t>
             </a:r>
           </a:p>
           <a:p>
             <a:pPr lvl="1"/>
             <a:endParaRPr lang="fr-FR" dirty="0"/>
           </a:p>
-          <a:p>
-            <a:r>
-              <a:rPr lang="fr-FR" dirty="0" smtClean="0"/>
-              <a:t>Conclusion : impossible de récupérer la donnée initiale</a:t>
-            </a:r>
+        </p:txBody>
+      </p:sp>
+      <p:sp>
+        <p:nvSpPr>
+          <p:cNvPr id="4" name="ZoneTexte 3"/>
+          <p:cNvSpPr txBox="1"/>
+          <p:nvPr/>
+        </p:nvSpPr>
+        <p:spPr>
+          <a:xfrm>
+            <a:off x="0" y="0"/>
+            <a:ext cx="4944752" cy="369332"/>
+          </a:xfrm>
+          <a:prstGeom prst="rect">
+            <a:avLst/>
+          </a:prstGeom>
+          <a:noFill/>
+        </p:spPr>
+        <p:txBody>
+          <a:bodyPr wrap="none" rtlCol="0">
+            <a:spAutoFit/>
+          </a:bodyPr>
+          <a:lstStyle/>
+          <a:p>
+            <a:r>
+              <a:rPr lang="fr-FR" dirty="0" smtClean="0"/>
+              <a:t>Exposé du problème -&gt; Solution -&gt; </a:t>
+            </a:r>
+            <a:r>
+              <a:rPr lang="fr-FR" b="1" dirty="0" smtClean="0"/>
+              <a:t>Notre approche</a:t>
+            </a:r>
+            <a:endParaRPr lang="fr-FR" b="1" dirty="0"/>
+          </a:p>
+        </p:txBody>
+      </p:sp>
+      <p:sp>
+        <p:nvSpPr>
+          <p:cNvPr id="6" name="Espace réservé du numéro de diapositive 5"/>
+          <p:cNvSpPr>
+            <a:spLocks noGrp="1"/>
+          </p:cNvSpPr>
+          <p:nvPr>
+            <p:ph type="sldNum" sz="quarter" idx="12"/>
+          </p:nvPr>
+        </p:nvSpPr>
+        <p:spPr/>
+        <p:txBody>
+          <a:bodyPr/>
+          <a:lstStyle/>
+          <a:p>
+            <a:fld id="{36A212DA-347D-4853-A3E5-DB8AA592974E}" type="slidenum">
+              <a:rPr lang="fr-FR" smtClean="0"/>
+              <a:t>12</a:t>
+            </a:fld>
+            <a:endParaRPr lang="fr-FR"/>
           </a:p>
         </p:txBody>
       </p:sp>
     </p:spTree>
     <p:extLst>
       <p:ext uri="{BB962C8B-B14F-4D97-AF65-F5344CB8AC3E}">
-        <p14:creationId xmlns:p14="http://schemas.microsoft.com/office/powerpoint/2010/main" val="1410180187"/>
+        <p14:creationId xmlns:p14="http://schemas.microsoft.com/office/powerpoint/2010/main" val="859945632"/>
       </p:ext>
     </p:extLst>
   </p:cSld>
@@ -4000,42 +4353,808 @@
           <a:p>
             <a:r>
               <a:rPr lang="fr-FR" dirty="0" smtClean="0"/>
-              <a:t>Illustration</a:t>
+              <a:t>Travail a exécuter</a:t>
             </a:r>
             <a:endParaRPr lang="fr-FR" dirty="0"/>
           </a:p>
         </p:txBody>
       </p:sp>
-      <p:pic>
-        <p:nvPicPr>
-          <p:cNvPr id="4" name="Espace réservé du contenu 3"/>
-          <p:cNvPicPr>
-            <a:picLocks noGrp="1" noChangeAspect="1"/>
-          </p:cNvPicPr>
-          <p:nvPr>
-            <p:ph idx="1"/>
-          </p:nvPr>
-        </p:nvPicPr>
-        <p:blipFill>
-          <a:blip r:embed="rId3"/>
-          <a:stretch>
-            <a:fillRect/>
-          </a:stretch>
-        </p:blipFill>
+      <p:sp>
+        <p:nvSpPr>
+          <p:cNvPr id="4" name="Rectangle 3"/>
+          <p:cNvSpPr/>
+          <p:nvPr/>
+        </p:nvSpPr>
         <p:spPr>
           <a:xfrm>
-            <a:off x="1151568" y="1690688"/>
-            <a:ext cx="9888864" cy="3543070"/>
+            <a:off x="1488138" y="1895525"/>
+            <a:ext cx="2097743" cy="1096869"/>
           </a:xfrm>
           <a:prstGeom prst="rect">
             <a:avLst/>
           </a:prstGeom>
         </p:spPr>
-      </p:pic>
+        <p:style>
+          <a:lnRef idx="2">
+            <a:schemeClr val="accent1">
+              <a:shade val="50000"/>
+            </a:schemeClr>
+          </a:lnRef>
+          <a:fillRef idx="1">
+            <a:schemeClr val="accent1"/>
+          </a:fillRef>
+          <a:effectRef idx="0">
+            <a:schemeClr val="accent1"/>
+          </a:effectRef>
+          <a:fontRef idx="minor">
+            <a:schemeClr val="lt1"/>
+          </a:fontRef>
+        </p:style>
+        <p:txBody>
+          <a:bodyPr rtlCol="0" anchor="ctr"/>
+          <a:lstStyle/>
+          <a:p>
+            <a:pPr algn="ctr"/>
+            <a:r>
+              <a:rPr lang="fr-FR" dirty="0" smtClean="0"/>
+              <a:t>Bloc 1 : Dégradation des données</a:t>
+            </a:r>
+            <a:endParaRPr lang="fr-FR" dirty="0"/>
+          </a:p>
+        </p:txBody>
+      </p:sp>
+      <p:sp>
+        <p:nvSpPr>
+          <p:cNvPr id="6" name="Rectangle 5"/>
+          <p:cNvSpPr/>
+          <p:nvPr/>
+        </p:nvSpPr>
+        <p:spPr>
+          <a:xfrm>
+            <a:off x="1488139" y="3448237"/>
+            <a:ext cx="2097743" cy="1087904"/>
+          </a:xfrm>
+          <a:prstGeom prst="rect">
+            <a:avLst/>
+          </a:prstGeom>
+        </p:spPr>
+        <p:style>
+          <a:lnRef idx="2">
+            <a:schemeClr val="accent1">
+              <a:shade val="50000"/>
+            </a:schemeClr>
+          </a:lnRef>
+          <a:fillRef idx="1">
+            <a:schemeClr val="accent1"/>
+          </a:fillRef>
+          <a:effectRef idx="0">
+            <a:schemeClr val="accent1"/>
+          </a:effectRef>
+          <a:fontRef idx="minor">
+            <a:schemeClr val="lt1"/>
+          </a:fontRef>
+        </p:style>
+        <p:txBody>
+          <a:bodyPr rtlCol="0" anchor="ctr"/>
+          <a:lstStyle/>
+          <a:p>
+            <a:pPr algn="ctr"/>
+            <a:r>
+              <a:rPr lang="fr-FR" dirty="0" smtClean="0"/>
+              <a:t>Bloc 2 : Chiffrement de chaque niveau de granularité</a:t>
+            </a:r>
+            <a:endParaRPr lang="fr-FR" dirty="0"/>
+          </a:p>
+        </p:txBody>
+      </p:sp>
+      <p:sp>
+        <p:nvSpPr>
+          <p:cNvPr id="7" name="Rectangle 6"/>
+          <p:cNvSpPr/>
+          <p:nvPr/>
+        </p:nvSpPr>
+        <p:spPr>
+          <a:xfrm>
+            <a:off x="5764304" y="3448237"/>
+            <a:ext cx="2097743" cy="1087904"/>
+          </a:xfrm>
+          <a:prstGeom prst="rect">
+            <a:avLst/>
+          </a:prstGeom>
+        </p:spPr>
+        <p:style>
+          <a:lnRef idx="2">
+            <a:schemeClr val="accent1">
+              <a:shade val="50000"/>
+            </a:schemeClr>
+          </a:lnRef>
+          <a:fillRef idx="1">
+            <a:schemeClr val="accent1"/>
+          </a:fillRef>
+          <a:effectRef idx="0">
+            <a:schemeClr val="accent1"/>
+          </a:effectRef>
+          <a:fontRef idx="minor">
+            <a:schemeClr val="lt1"/>
+          </a:fontRef>
+        </p:style>
+        <p:txBody>
+          <a:bodyPr rtlCol="0" anchor="ctr"/>
+          <a:lstStyle/>
+          <a:p>
+            <a:pPr algn="ctr"/>
+            <a:r>
+              <a:rPr lang="fr-FR" dirty="0" smtClean="0"/>
+              <a:t>Bloc 3 : Découpe des clés</a:t>
+            </a:r>
+            <a:endParaRPr lang="fr-FR" dirty="0"/>
+          </a:p>
+        </p:txBody>
+      </p:sp>
+      <p:sp>
+        <p:nvSpPr>
+          <p:cNvPr id="8" name="Rectangle 7"/>
+          <p:cNvSpPr/>
+          <p:nvPr/>
+        </p:nvSpPr>
+        <p:spPr>
+          <a:xfrm>
+            <a:off x="1488138" y="4947162"/>
+            <a:ext cx="2097743" cy="1087904"/>
+          </a:xfrm>
+          <a:prstGeom prst="rect">
+            <a:avLst/>
+          </a:prstGeom>
+        </p:spPr>
+        <p:style>
+          <a:lnRef idx="2">
+            <a:schemeClr val="accent1">
+              <a:shade val="50000"/>
+            </a:schemeClr>
+          </a:lnRef>
+          <a:fillRef idx="1">
+            <a:schemeClr val="accent1"/>
+          </a:fillRef>
+          <a:effectRef idx="0">
+            <a:schemeClr val="accent1"/>
+          </a:effectRef>
+          <a:fontRef idx="minor">
+            <a:schemeClr val="lt1"/>
+          </a:fontRef>
+        </p:style>
+        <p:txBody>
+          <a:bodyPr rtlCol="0" anchor="ctr"/>
+          <a:lstStyle/>
+          <a:p>
+            <a:pPr algn="ctr"/>
+            <a:r>
+              <a:rPr lang="fr-FR" dirty="0" smtClean="0"/>
+              <a:t>Bloc 4 : Hébergement des données</a:t>
+            </a:r>
+            <a:endParaRPr lang="fr-FR" dirty="0"/>
+          </a:p>
+        </p:txBody>
+      </p:sp>
+      <p:sp>
+        <p:nvSpPr>
+          <p:cNvPr id="10" name="Ellipse 9"/>
+          <p:cNvSpPr/>
+          <p:nvPr/>
+        </p:nvSpPr>
+        <p:spPr>
+          <a:xfrm>
+            <a:off x="5800163" y="4969805"/>
+            <a:ext cx="2026024" cy="1087904"/>
+          </a:xfrm>
+          <a:prstGeom prst="ellipse">
+            <a:avLst/>
+          </a:prstGeom>
+        </p:spPr>
+        <p:style>
+          <a:lnRef idx="2">
+            <a:schemeClr val="accent1">
+              <a:shade val="50000"/>
+            </a:schemeClr>
+          </a:lnRef>
+          <a:fillRef idx="1">
+            <a:schemeClr val="accent1"/>
+          </a:fillRef>
+          <a:effectRef idx="0">
+            <a:schemeClr val="accent1"/>
+          </a:effectRef>
+          <a:fontRef idx="minor">
+            <a:schemeClr val="lt1"/>
+          </a:fontRef>
+        </p:style>
+        <p:txBody>
+          <a:bodyPr rtlCol="0" anchor="ctr"/>
+          <a:lstStyle/>
+          <a:p>
+            <a:pPr algn="ctr"/>
+            <a:r>
+              <a:rPr lang="fr-FR" dirty="0" smtClean="0"/>
+              <a:t>DHT</a:t>
+            </a:r>
+            <a:endParaRPr lang="fr-FR" dirty="0"/>
+          </a:p>
+        </p:txBody>
+      </p:sp>
+      <p:cxnSp>
+        <p:nvCxnSpPr>
+          <p:cNvPr id="12" name="Connecteur droit avec flèche 11"/>
+          <p:cNvCxnSpPr>
+            <a:stCxn id="4" idx="2"/>
+            <a:endCxn id="6" idx="0"/>
+          </p:cNvCxnSpPr>
+          <p:nvPr/>
+        </p:nvCxnSpPr>
+        <p:spPr>
+          <a:xfrm>
+            <a:off x="2537010" y="2992394"/>
+            <a:ext cx="1" cy="455843"/>
+          </a:xfrm>
+          <a:prstGeom prst="straightConnector1">
+            <a:avLst/>
+          </a:prstGeom>
+          <a:ln>
+            <a:tailEnd type="triangle"/>
+          </a:ln>
+        </p:spPr>
+        <p:style>
+          <a:lnRef idx="1">
+            <a:schemeClr val="accent1"/>
+          </a:lnRef>
+          <a:fillRef idx="0">
+            <a:schemeClr val="accent1"/>
+          </a:fillRef>
+          <a:effectRef idx="0">
+            <a:schemeClr val="accent1"/>
+          </a:effectRef>
+          <a:fontRef idx="minor">
+            <a:schemeClr val="tx1"/>
+          </a:fontRef>
+        </p:style>
+      </p:cxnSp>
+      <p:cxnSp>
+        <p:nvCxnSpPr>
+          <p:cNvPr id="14" name="Connecteur droit avec flèche 13"/>
+          <p:cNvCxnSpPr>
+            <a:stCxn id="6" idx="2"/>
+            <a:endCxn id="8" idx="0"/>
+          </p:cNvCxnSpPr>
+          <p:nvPr/>
+        </p:nvCxnSpPr>
+        <p:spPr>
+          <a:xfrm flipH="1">
+            <a:off x="2537010" y="4536141"/>
+            <a:ext cx="1" cy="411021"/>
+          </a:xfrm>
+          <a:prstGeom prst="straightConnector1">
+            <a:avLst/>
+          </a:prstGeom>
+          <a:ln>
+            <a:tailEnd type="triangle"/>
+          </a:ln>
+        </p:spPr>
+        <p:style>
+          <a:lnRef idx="1">
+            <a:schemeClr val="accent1"/>
+          </a:lnRef>
+          <a:fillRef idx="0">
+            <a:schemeClr val="accent1"/>
+          </a:fillRef>
+          <a:effectRef idx="0">
+            <a:schemeClr val="accent1"/>
+          </a:effectRef>
+          <a:fontRef idx="minor">
+            <a:schemeClr val="tx1"/>
+          </a:fontRef>
+        </p:style>
+      </p:cxnSp>
+      <p:cxnSp>
+        <p:nvCxnSpPr>
+          <p:cNvPr id="16" name="Connecteur droit avec flèche 15"/>
+          <p:cNvCxnSpPr>
+            <a:stCxn id="6" idx="3"/>
+            <a:endCxn id="7" idx="1"/>
+          </p:cNvCxnSpPr>
+          <p:nvPr/>
+        </p:nvCxnSpPr>
+        <p:spPr>
+          <a:xfrm>
+            <a:off x="3585882" y="3992189"/>
+            <a:ext cx="2178422" cy="0"/>
+          </a:xfrm>
+          <a:prstGeom prst="straightConnector1">
+            <a:avLst/>
+          </a:prstGeom>
+          <a:ln>
+            <a:tailEnd type="triangle"/>
+          </a:ln>
+        </p:spPr>
+        <p:style>
+          <a:lnRef idx="1">
+            <a:schemeClr val="accent1"/>
+          </a:lnRef>
+          <a:fillRef idx="0">
+            <a:schemeClr val="accent1"/>
+          </a:fillRef>
+          <a:effectRef idx="0">
+            <a:schemeClr val="accent1"/>
+          </a:effectRef>
+          <a:fontRef idx="minor">
+            <a:schemeClr val="tx1"/>
+          </a:fontRef>
+        </p:style>
+      </p:cxnSp>
+      <p:cxnSp>
+        <p:nvCxnSpPr>
+          <p:cNvPr id="18" name="Connecteur droit avec flèche 17"/>
+          <p:cNvCxnSpPr>
+            <a:stCxn id="7" idx="2"/>
+            <a:endCxn id="10" idx="0"/>
+          </p:cNvCxnSpPr>
+          <p:nvPr/>
+        </p:nvCxnSpPr>
+        <p:spPr>
+          <a:xfrm flipH="1">
+            <a:off x="6813175" y="4536141"/>
+            <a:ext cx="1" cy="433664"/>
+          </a:xfrm>
+          <a:prstGeom prst="straightConnector1">
+            <a:avLst/>
+          </a:prstGeom>
+          <a:ln>
+            <a:tailEnd type="triangle"/>
+          </a:ln>
+        </p:spPr>
+        <p:style>
+          <a:lnRef idx="1">
+            <a:schemeClr val="accent1"/>
+          </a:lnRef>
+          <a:fillRef idx="0">
+            <a:schemeClr val="accent1"/>
+          </a:fillRef>
+          <a:effectRef idx="0">
+            <a:schemeClr val="accent1"/>
+          </a:effectRef>
+          <a:fontRef idx="minor">
+            <a:schemeClr val="tx1"/>
+          </a:fontRef>
+        </p:style>
+      </p:cxnSp>
+      <p:sp>
+        <p:nvSpPr>
+          <p:cNvPr id="19" name="Émoticône 18"/>
+          <p:cNvSpPr/>
+          <p:nvPr/>
+        </p:nvSpPr>
+        <p:spPr>
+          <a:xfrm>
+            <a:off x="8301318" y="995245"/>
+            <a:ext cx="914400" cy="914400"/>
+          </a:xfrm>
+          <a:prstGeom prst="smileyFace">
+            <a:avLst/>
+          </a:prstGeom>
+        </p:spPr>
+        <p:style>
+          <a:lnRef idx="2">
+            <a:schemeClr val="accent1">
+              <a:shade val="50000"/>
+            </a:schemeClr>
+          </a:lnRef>
+          <a:fillRef idx="1">
+            <a:schemeClr val="accent1"/>
+          </a:fillRef>
+          <a:effectRef idx="0">
+            <a:schemeClr val="accent1"/>
+          </a:effectRef>
+          <a:fontRef idx="minor">
+            <a:schemeClr val="lt1"/>
+          </a:fontRef>
+        </p:style>
+        <p:txBody>
+          <a:bodyPr rtlCol="0" anchor="ctr"/>
+          <a:lstStyle/>
+          <a:p>
+            <a:pPr algn="ctr"/>
+            <a:endParaRPr lang="fr-FR"/>
+          </a:p>
+        </p:txBody>
+      </p:sp>
+      <p:cxnSp>
+        <p:nvCxnSpPr>
+          <p:cNvPr id="21" name="Connecteur en angle 20"/>
+          <p:cNvCxnSpPr>
+            <a:stCxn id="10" idx="6"/>
+            <a:endCxn id="19" idx="6"/>
+          </p:cNvCxnSpPr>
+          <p:nvPr/>
+        </p:nvCxnSpPr>
+        <p:spPr>
+          <a:xfrm flipV="1">
+            <a:off x="7826187" y="1452445"/>
+            <a:ext cx="1389531" cy="4061312"/>
+          </a:xfrm>
+          <a:prstGeom prst="bentConnector3">
+            <a:avLst>
+              <a:gd name="adj1" fmla="val 175807"/>
+            </a:avLst>
+          </a:prstGeom>
+          <a:ln>
+            <a:tailEnd type="triangle"/>
+          </a:ln>
+        </p:spPr>
+        <p:style>
+          <a:lnRef idx="1">
+            <a:schemeClr val="accent1"/>
+          </a:lnRef>
+          <a:fillRef idx="0">
+            <a:schemeClr val="accent1"/>
+          </a:fillRef>
+          <a:effectRef idx="0">
+            <a:schemeClr val="accent1"/>
+          </a:effectRef>
+          <a:fontRef idx="minor">
+            <a:schemeClr val="tx1"/>
+          </a:fontRef>
+        </p:style>
+      </p:cxnSp>
+      <p:cxnSp>
+        <p:nvCxnSpPr>
+          <p:cNvPr id="24" name="Connecteur en angle 23"/>
+          <p:cNvCxnSpPr>
+            <a:stCxn id="8" idx="2"/>
+            <a:endCxn id="19" idx="6"/>
+          </p:cNvCxnSpPr>
+          <p:nvPr/>
+        </p:nvCxnSpPr>
+        <p:spPr>
+          <a:xfrm rot="5400000" flipH="1" flipV="1">
+            <a:off x="3585053" y="404402"/>
+            <a:ext cx="4582621" cy="6678708"/>
+          </a:xfrm>
+          <a:prstGeom prst="bentConnector4">
+            <a:avLst>
+              <a:gd name="adj1" fmla="val -4988"/>
+              <a:gd name="adj2" fmla="val 115772"/>
+            </a:avLst>
+          </a:prstGeom>
+          <a:ln>
+            <a:tailEnd type="triangle"/>
+          </a:ln>
+        </p:spPr>
+        <p:style>
+          <a:lnRef idx="1">
+            <a:schemeClr val="accent1"/>
+          </a:lnRef>
+          <a:fillRef idx="0">
+            <a:schemeClr val="accent1"/>
+          </a:fillRef>
+          <a:effectRef idx="0">
+            <a:schemeClr val="accent1"/>
+          </a:effectRef>
+          <a:fontRef idx="minor">
+            <a:schemeClr val="tx1"/>
+          </a:fontRef>
+        </p:style>
+      </p:cxnSp>
+      <p:cxnSp>
+        <p:nvCxnSpPr>
+          <p:cNvPr id="27" name="Connecteur en angle 26"/>
+          <p:cNvCxnSpPr>
+            <a:stCxn id="19" idx="2"/>
+            <a:endCxn id="4" idx="0"/>
+          </p:cNvCxnSpPr>
+          <p:nvPr/>
+        </p:nvCxnSpPr>
+        <p:spPr>
+          <a:xfrm rot="10800000" flipV="1">
+            <a:off x="2537010" y="1452445"/>
+            <a:ext cx="5764308" cy="443080"/>
+          </a:xfrm>
+          <a:prstGeom prst="bentConnector2">
+            <a:avLst/>
+          </a:prstGeom>
+          <a:ln>
+            <a:tailEnd type="triangle"/>
+          </a:ln>
+        </p:spPr>
+        <p:style>
+          <a:lnRef idx="1">
+            <a:schemeClr val="accent1"/>
+          </a:lnRef>
+          <a:fillRef idx="0">
+            <a:schemeClr val="accent1"/>
+          </a:fillRef>
+          <a:effectRef idx="0">
+            <a:schemeClr val="accent1"/>
+          </a:effectRef>
+          <a:fontRef idx="minor">
+            <a:schemeClr val="tx1"/>
+          </a:fontRef>
+        </p:style>
+      </p:cxnSp>
+      <p:sp>
+        <p:nvSpPr>
+          <p:cNvPr id="43" name="ZoneTexte 42"/>
+          <p:cNvSpPr txBox="1"/>
+          <p:nvPr/>
+        </p:nvSpPr>
+        <p:spPr>
+          <a:xfrm>
+            <a:off x="2835566" y="4555188"/>
+            <a:ext cx="1875385" cy="369332"/>
+          </a:xfrm>
+          <a:prstGeom prst="rect">
+            <a:avLst/>
+          </a:prstGeom>
+          <a:noFill/>
+        </p:spPr>
+        <p:txBody>
+          <a:bodyPr wrap="none" rtlCol="0">
+            <a:spAutoFit/>
+          </a:bodyPr>
+          <a:lstStyle/>
+          <a:p>
+            <a:r>
+              <a:rPr lang="fr-FR" dirty="0" smtClean="0"/>
+              <a:t>Données chiffrées</a:t>
+            </a:r>
+            <a:endParaRPr lang="fr-FR" dirty="0"/>
+          </a:p>
+        </p:txBody>
+      </p:sp>
+      <p:sp>
+        <p:nvSpPr>
+          <p:cNvPr id="44" name="ZoneTexte 43"/>
+          <p:cNvSpPr txBox="1"/>
+          <p:nvPr/>
+        </p:nvSpPr>
+        <p:spPr>
+          <a:xfrm>
+            <a:off x="2537008" y="3040457"/>
+            <a:ext cx="2303964" cy="369332"/>
+          </a:xfrm>
+          <a:prstGeom prst="rect">
+            <a:avLst/>
+          </a:prstGeom>
+          <a:noFill/>
+        </p:spPr>
+        <p:txBody>
+          <a:bodyPr wrap="none" rtlCol="0">
+            <a:spAutoFit/>
+          </a:bodyPr>
+          <a:lstStyle/>
+          <a:p>
+            <a:r>
+              <a:rPr lang="fr-FR" dirty="0" smtClean="0"/>
+              <a:t>Niveaux de granularité</a:t>
+            </a:r>
+            <a:endParaRPr lang="fr-FR" dirty="0"/>
+          </a:p>
+        </p:txBody>
+      </p:sp>
+      <p:sp>
+        <p:nvSpPr>
+          <p:cNvPr id="45" name="ZoneTexte 44"/>
+          <p:cNvSpPr txBox="1"/>
+          <p:nvPr/>
+        </p:nvSpPr>
+        <p:spPr>
+          <a:xfrm>
+            <a:off x="3737400" y="3613586"/>
+            <a:ext cx="1028167" cy="369332"/>
+          </a:xfrm>
+          <a:prstGeom prst="rect">
+            <a:avLst/>
+          </a:prstGeom>
+          <a:noFill/>
+        </p:spPr>
+        <p:txBody>
+          <a:bodyPr wrap="none" rtlCol="0">
+            <a:spAutoFit/>
+          </a:bodyPr>
+          <a:lstStyle/>
+          <a:p>
+            <a:r>
+              <a:rPr lang="fr-FR" dirty="0" smtClean="0"/>
+              <a:t>1 clé/</a:t>
+            </a:r>
+            <a:r>
+              <a:rPr lang="fr-FR" dirty="0" err="1" smtClean="0"/>
+              <a:t>niv</a:t>
+            </a:r>
+            <a:r>
+              <a:rPr lang="fr-FR" dirty="0" smtClean="0"/>
+              <a:t>.</a:t>
+            </a:r>
+            <a:endParaRPr lang="fr-FR" dirty="0"/>
+          </a:p>
+        </p:txBody>
+      </p:sp>
+      <p:sp>
+        <p:nvSpPr>
+          <p:cNvPr id="46" name="ZoneTexte 45"/>
+          <p:cNvSpPr txBox="1"/>
+          <p:nvPr/>
+        </p:nvSpPr>
+        <p:spPr>
+          <a:xfrm>
+            <a:off x="7071388" y="4577830"/>
+            <a:ext cx="1638269" cy="369332"/>
+          </a:xfrm>
+          <a:prstGeom prst="rect">
+            <a:avLst/>
+          </a:prstGeom>
+          <a:noFill/>
+        </p:spPr>
+        <p:txBody>
+          <a:bodyPr wrap="none" rtlCol="0">
+            <a:spAutoFit/>
+          </a:bodyPr>
+          <a:lstStyle/>
+          <a:p>
+            <a:r>
+              <a:rPr lang="fr-FR" dirty="0" smtClean="0"/>
+              <a:t>Clés découpées</a:t>
+            </a:r>
+            <a:endParaRPr lang="fr-FR" dirty="0"/>
+          </a:p>
+        </p:txBody>
+      </p:sp>
+      <p:sp>
+        <p:nvSpPr>
+          <p:cNvPr id="47" name="ZoneTexte 46"/>
+          <p:cNvSpPr txBox="1"/>
+          <p:nvPr/>
+        </p:nvSpPr>
+        <p:spPr>
+          <a:xfrm>
+            <a:off x="7976826" y="5524463"/>
+            <a:ext cx="1878206" cy="369332"/>
+          </a:xfrm>
+          <a:prstGeom prst="rect">
+            <a:avLst/>
+          </a:prstGeom>
+          <a:noFill/>
+        </p:spPr>
+        <p:txBody>
+          <a:bodyPr wrap="none" rtlCol="0">
+            <a:spAutoFit/>
+          </a:bodyPr>
+          <a:lstStyle/>
+          <a:p>
+            <a:r>
+              <a:rPr lang="fr-FR" dirty="0" smtClean="0"/>
+              <a:t>Clé de localisation</a:t>
+            </a:r>
+            <a:endParaRPr lang="fr-FR" dirty="0"/>
+          </a:p>
+        </p:txBody>
+      </p:sp>
+      <p:sp>
+        <p:nvSpPr>
+          <p:cNvPr id="48" name="ZoneTexte 47"/>
+          <p:cNvSpPr txBox="1"/>
+          <p:nvPr/>
+        </p:nvSpPr>
+        <p:spPr>
+          <a:xfrm>
+            <a:off x="2852613" y="6272132"/>
+            <a:ext cx="1891865" cy="369332"/>
+          </a:xfrm>
+          <a:prstGeom prst="rect">
+            <a:avLst/>
+          </a:prstGeom>
+          <a:noFill/>
+        </p:spPr>
+        <p:txBody>
+          <a:bodyPr wrap="none" rtlCol="0">
+            <a:spAutoFit/>
+          </a:bodyPr>
+          <a:lstStyle/>
+          <a:p>
+            <a:r>
+              <a:rPr lang="fr-FR" dirty="0" smtClean="0"/>
+              <a:t>Hash des données</a:t>
+            </a:r>
+            <a:endParaRPr lang="fr-FR" dirty="0"/>
+          </a:p>
+        </p:txBody>
+      </p:sp>
+      <p:sp>
+        <p:nvSpPr>
+          <p:cNvPr id="49" name="ZoneTexte 48"/>
+          <p:cNvSpPr txBox="1"/>
+          <p:nvPr/>
+        </p:nvSpPr>
+        <p:spPr>
+          <a:xfrm>
+            <a:off x="5158307" y="1030713"/>
+            <a:ext cx="2567306" cy="369332"/>
+          </a:xfrm>
+          <a:prstGeom prst="rect">
+            <a:avLst/>
+          </a:prstGeom>
+          <a:noFill/>
+        </p:spPr>
+        <p:txBody>
+          <a:bodyPr wrap="none" rtlCol="0">
+            <a:spAutoFit/>
+          </a:bodyPr>
+          <a:lstStyle/>
+          <a:p>
+            <a:r>
+              <a:rPr lang="fr-FR" dirty="0" smtClean="0"/>
+              <a:t>Données et durées de vie</a:t>
+            </a:r>
+            <a:endParaRPr lang="fr-FR" dirty="0"/>
+          </a:p>
+        </p:txBody>
+      </p:sp>
+      <p:sp>
+        <p:nvSpPr>
+          <p:cNvPr id="50" name="ZoneTexte 49"/>
+          <p:cNvSpPr txBox="1"/>
+          <p:nvPr/>
+        </p:nvSpPr>
+        <p:spPr>
+          <a:xfrm>
+            <a:off x="0" y="0"/>
+            <a:ext cx="4944752" cy="369332"/>
+          </a:xfrm>
+          <a:prstGeom prst="rect">
+            <a:avLst/>
+          </a:prstGeom>
+          <a:noFill/>
+        </p:spPr>
+        <p:txBody>
+          <a:bodyPr wrap="none" rtlCol="0">
+            <a:spAutoFit/>
+          </a:bodyPr>
+          <a:lstStyle/>
+          <a:p>
+            <a:r>
+              <a:rPr lang="fr-FR" dirty="0" smtClean="0"/>
+              <a:t>Exposé du problème -&gt; Solution -&gt; </a:t>
+            </a:r>
+            <a:r>
+              <a:rPr lang="fr-FR" b="1" dirty="0" smtClean="0"/>
+              <a:t>Notre approche</a:t>
+            </a:r>
+            <a:endParaRPr lang="fr-FR" b="1" dirty="0"/>
+          </a:p>
+        </p:txBody>
+      </p:sp>
+      <p:sp>
+        <p:nvSpPr>
+          <p:cNvPr id="5" name="Espace réservé du numéro de diapositive 4"/>
+          <p:cNvSpPr>
+            <a:spLocks noGrp="1"/>
+          </p:cNvSpPr>
+          <p:nvPr>
+            <p:ph type="sldNum" sz="quarter" idx="12"/>
+          </p:nvPr>
+        </p:nvSpPr>
+        <p:spPr/>
+        <p:txBody>
+          <a:bodyPr/>
+          <a:lstStyle/>
+          <a:p>
+            <a:fld id="{36A212DA-347D-4853-A3E5-DB8AA592974E}" type="slidenum">
+              <a:rPr lang="fr-FR" smtClean="0"/>
+              <a:t>13</a:t>
+            </a:fld>
+            <a:endParaRPr lang="fr-FR"/>
+          </a:p>
+        </p:txBody>
+      </p:sp>
     </p:spTree>
     <p:extLst>
       <p:ext uri="{BB962C8B-B14F-4D97-AF65-F5344CB8AC3E}">
-        <p14:creationId xmlns:p14="http://schemas.microsoft.com/office/powerpoint/2010/main" val="1116215067"/>
+        <p14:creationId xmlns:p14="http://schemas.microsoft.com/office/powerpoint/2010/main" val="463361665"/>
       </p:ext>
     </p:extLst>
   </p:cSld>
@@ -4079,11 +5198,7 @@
           <a:p>
             <a:r>
               <a:rPr lang="fr-FR" dirty="0" smtClean="0"/>
-              <a:t>Une implémentation : </a:t>
-            </a:r>
-            <a:r>
-              <a:rPr lang="fr-FR" dirty="0" err="1" smtClean="0"/>
-              <a:t>Vanish</a:t>
+              <a:t>Chiffrement RSA</a:t>
             </a:r>
             <a:endParaRPr lang="fr-FR" dirty="0"/>
           </a:p>
@@ -4106,56 +5221,116 @@
           </a:bodyPr>
           <a:lstStyle/>
           <a:p>
+            <a:r>
+              <a:rPr lang="fr-FR" dirty="0" smtClean="0"/>
+              <a:t>Données importantes : n (= p*q, premiers), e (choisi à la création de la clé), d (tel que e*d+k*(p-1)(q-1) = 1).</a:t>
+            </a:r>
+          </a:p>
+          <a:p>
+            <a:r>
+              <a:rPr lang="fr-FR" dirty="0" smtClean="0"/>
+              <a:t>C = M</a:t>
+            </a:r>
+            <a:r>
+              <a:rPr lang="fr-FR" baseline="30000" dirty="0" smtClean="0"/>
+              <a:t>e</a:t>
+            </a:r>
+            <a:r>
+              <a:rPr lang="fr-FR" dirty="0" smtClean="0"/>
+              <a:t>[n]</a:t>
+            </a:r>
+          </a:p>
+          <a:p>
+            <a:r>
+              <a:rPr lang="fr-FR" dirty="0" smtClean="0"/>
+              <a:t>M = M </a:t>
+            </a:r>
+            <a:r>
+              <a:rPr lang="fr-FR" baseline="30000" dirty="0" smtClean="0"/>
+              <a:t>e*d</a:t>
+            </a:r>
+            <a:r>
+              <a:rPr lang="fr-FR" dirty="0" smtClean="0"/>
+              <a:t> [n]</a:t>
+            </a:r>
+          </a:p>
+          <a:p>
             <a:endParaRPr lang="fr-FR" dirty="0" smtClean="0"/>
           </a:p>
           <a:p>
             <a:r>
               <a:rPr lang="fr-FR" dirty="0" smtClean="0"/>
-              <a:t>Construite sur </a:t>
-            </a:r>
-            <a:r>
-              <a:rPr lang="fr-FR" dirty="0" err="1" smtClean="0"/>
-              <a:t>Vuze</a:t>
-            </a:r>
-            <a:r>
-              <a:rPr lang="fr-FR" dirty="0" smtClean="0"/>
-              <a:t>, une DHT commerciale avec 1.5M de nœuds connectés simultanément </a:t>
-            </a:r>
-          </a:p>
-          <a:p>
+              <a:t>Il suffit de transmettre n et d </a:t>
+            </a:r>
+            <a:r>
+              <a:rPr lang="fr-FR" smtClean="0"/>
+              <a:t>pour déchiffrer un message.</a:t>
+            </a:r>
             <a:endParaRPr lang="fr-FR" dirty="0" smtClean="0"/>
           </a:p>
-          <a:p>
-            <a:r>
-              <a:rPr lang="fr-FR" dirty="0" smtClean="0"/>
-              <a:t>Ca marche !!</a:t>
-            </a:r>
-          </a:p>
-          <a:p>
-            <a:pPr lvl="1"/>
-            <a:r>
-              <a:rPr lang="fr-FR" dirty="0" smtClean="0"/>
-              <a:t>Firefox et Thunderbird plugins</a:t>
-            </a:r>
-          </a:p>
-          <a:p>
-            <a:endParaRPr lang="fr-FR" dirty="0"/>
-          </a:p>
-          <a:p>
-            <a:r>
-              <a:rPr lang="fr-FR" dirty="0" smtClean="0"/>
-              <a:t>Mais vulnérabilité aux attaques par Sybille</a:t>
-            </a:r>
-          </a:p>
-          <a:p>
-            <a:endParaRPr lang="fr-FR" dirty="0" smtClean="0"/>
+        </p:txBody>
+      </p:sp>
+      <p:sp>
+        <p:nvSpPr>
+          <p:cNvPr id="4" name="ZoneTexte 3"/>
+          <p:cNvSpPr txBox="1"/>
+          <p:nvPr/>
+        </p:nvSpPr>
+        <p:spPr>
+          <a:xfrm>
+            <a:off x="0" y="0"/>
+            <a:ext cx="4944752" cy="369332"/>
+          </a:xfrm>
+          <a:prstGeom prst="rect">
+            <a:avLst/>
+          </a:prstGeom>
+          <a:noFill/>
+        </p:spPr>
+        <p:txBody>
+          <a:bodyPr wrap="none" rtlCol="0">
+            <a:spAutoFit/>
+          </a:bodyPr>
+          <a:lstStyle/>
+          <a:p>
+            <a:r>
+              <a:rPr lang="fr-FR" dirty="0" smtClean="0"/>
+              <a:t>Exposé du problème -&gt; Solution -&gt; </a:t>
+            </a:r>
+            <a:r>
+              <a:rPr lang="fr-FR" b="1" dirty="0" smtClean="0"/>
+              <a:t>Notre approche</a:t>
+            </a:r>
+            <a:endParaRPr lang="fr-FR" b="1" dirty="0"/>
+          </a:p>
+        </p:txBody>
+      </p:sp>
+      <p:sp>
+        <p:nvSpPr>
+          <p:cNvPr id="6" name="Espace réservé du numéro de diapositive 5"/>
+          <p:cNvSpPr>
+            <a:spLocks noGrp="1"/>
+          </p:cNvSpPr>
+          <p:nvPr>
+            <p:ph type="sldNum" sz="quarter" idx="12"/>
+          </p:nvPr>
+        </p:nvSpPr>
+        <p:spPr/>
+        <p:txBody>
+          <a:bodyPr/>
+          <a:lstStyle/>
+          <a:p>
+            <a:fld id="{36A212DA-347D-4853-A3E5-DB8AA592974E}" type="slidenum">
+              <a:rPr lang="fr-FR" smtClean="0"/>
+              <a:t>14</a:t>
+            </a:fld>
+            <a:endParaRPr lang="fr-FR"/>
           </a:p>
         </p:txBody>
       </p:sp>
     </p:spTree>
     <p:extLst>
       <p:ext uri="{BB962C8B-B14F-4D97-AF65-F5344CB8AC3E}">
-        <p14:creationId xmlns:p14="http://schemas.microsoft.com/office/powerpoint/2010/main" val="1512558587"/>
+        <p14:creationId xmlns:p14="http://schemas.microsoft.com/office/powerpoint/2010/main" val="2771328304"/>
       </p:ext>
     </p:extLst>
   </p:cSld>
@@ -4199,7 +5374,7 @@
           <a:p>
             <a:r>
               <a:rPr lang="fr-FR" dirty="0" smtClean="0"/>
-              <a:t>Notre approche : application à la dégradation de données de géolocalisation</a:t>
+              <a:t>Interpolation polynomiale</a:t>
             </a:r>
             <a:endParaRPr lang="fr-FR" dirty="0"/>
           </a:p>
@@ -4207,27 +5382,106 @@
       </p:sp>
       <p:sp>
         <p:nvSpPr>
-          <p:cNvPr id="3" name="Espace réservé du texte 2"/>
-          <p:cNvSpPr>
-            <a:spLocks noGrp="1"/>
-          </p:cNvSpPr>
-          <p:nvPr>
-            <p:ph type="body" idx="1"/>
-          </p:nvPr>
-        </p:nvSpPr>
-        <p:spPr/>
-        <p:txBody>
-          <a:bodyPr/>
-          <a:lstStyle/>
-          <a:p>
-            <a:endParaRPr lang="fr-FR"/>
-          </a:p>
-        </p:txBody>
-      </p:sp>
+          <p:cNvPr id="4" name="ZoneTexte 3"/>
+          <p:cNvSpPr txBox="1"/>
+          <p:nvPr/>
+        </p:nvSpPr>
+        <p:spPr>
+          <a:xfrm>
+            <a:off x="0" y="0"/>
+            <a:ext cx="4944752" cy="369332"/>
+          </a:xfrm>
+          <a:prstGeom prst="rect">
+            <a:avLst/>
+          </a:prstGeom>
+          <a:noFill/>
+        </p:spPr>
+        <p:txBody>
+          <a:bodyPr wrap="none" rtlCol="0">
+            <a:spAutoFit/>
+          </a:bodyPr>
+          <a:lstStyle/>
+          <a:p>
+            <a:r>
+              <a:rPr lang="fr-FR" dirty="0" smtClean="0"/>
+              <a:t>Exposé du problème -&gt; Solution -&gt; </a:t>
+            </a:r>
+            <a:r>
+              <a:rPr lang="fr-FR" b="1" dirty="0" smtClean="0"/>
+              <a:t>Notre approche</a:t>
+            </a:r>
+            <a:endParaRPr lang="fr-FR" b="1" dirty="0"/>
+          </a:p>
+        </p:txBody>
+      </p:sp>
+      <p:sp>
+        <p:nvSpPr>
+          <p:cNvPr id="6" name="Espace réservé du numéro de diapositive 5"/>
+          <p:cNvSpPr>
+            <a:spLocks noGrp="1"/>
+          </p:cNvSpPr>
+          <p:nvPr>
+            <p:ph type="sldNum" sz="quarter" idx="12"/>
+          </p:nvPr>
+        </p:nvSpPr>
+        <p:spPr/>
+        <p:txBody>
+          <a:bodyPr/>
+          <a:lstStyle/>
+          <a:p>
+            <a:fld id="{36A212DA-347D-4853-A3E5-DB8AA592974E}" type="slidenum">
+              <a:rPr lang="fr-FR" smtClean="0"/>
+              <a:t>15</a:t>
+            </a:fld>
+            <a:endParaRPr lang="fr-FR"/>
+          </a:p>
+        </p:txBody>
+      </p:sp>
+      <p:pic>
+        <p:nvPicPr>
+          <p:cNvPr id="2050" name="Picture 2" descr="http://upload.wikimedia.org/wikipedia/commons/6/6b/Interpolation_runge_funktion_10_stuetzstellen.png"/>
+          <p:cNvPicPr>
+            <a:picLocks noChangeAspect="1" noChangeArrowheads="1"/>
+          </p:cNvPicPr>
+          <p:nvPr/>
+        </p:nvPicPr>
+        <p:blipFill>
+          <a:blip r:embed="rId2">
+            <a:extLst>
+              <a:ext uri="{28A0092B-C50C-407E-A947-70E740481C1C}">
+                <a14:useLocalDpi xmlns:a14="http://schemas.microsoft.com/office/drawing/2010/main" val="0"/>
+              </a:ext>
+            </a:extLst>
+          </a:blip>
+          <a:srcRect/>
+          <a:stretch>
+            <a:fillRect/>
+          </a:stretch>
+        </p:blipFill>
+        <p:spPr bwMode="auto">
+          <a:xfrm>
+            <a:off x="2692400" y="1444147"/>
+            <a:ext cx="6807200" cy="5094765"/>
+          </a:xfrm>
+          <a:prstGeom prst="rect">
+            <a:avLst/>
+          </a:prstGeom>
+          <a:noFill/>
+          <a:extLst>
+            <a:ext uri="{909E8E84-426E-40DD-AFC4-6F175D3DCCD1}">
+              <a14:hiddenFill xmlns:a14="http://schemas.microsoft.com/office/drawing/2010/main">
+                <a:solidFill>
+                  <a:srgbClr val="FFFFFF"/>
+                </a:solidFill>
+              </a14:hiddenFill>
+            </a:ext>
+          </a:extLst>
+        </p:spPr>
+      </p:pic>
     </p:spTree>
     <p:extLst>
       <p:ext uri="{BB962C8B-B14F-4D97-AF65-F5344CB8AC3E}">
-        <p14:creationId xmlns:p14="http://schemas.microsoft.com/office/powerpoint/2010/main" val="2936282269"/>
+        <p14:creationId xmlns:p14="http://schemas.microsoft.com/office/powerpoint/2010/main" val="3386361244"/>
       </p:ext>
     </p:extLst>
   </p:cSld>
@@ -4270,57 +5524,202 @@
           <a:lstStyle/>
           <a:p>
             <a:r>
-              <a:rPr lang="fr-FR" dirty="0" smtClean="0"/>
-              <a:t>Objectifs</a:t>
+              <a:rPr lang="fr-FR" dirty="0"/>
+              <a:t>Choix de la DHT</a:t>
+            </a:r>
+          </a:p>
+        </p:txBody>
+      </p:sp>
+      <p:sp>
+        <p:nvSpPr>
+          <p:cNvPr id="3" name="Espace réservé du contenu 2"/>
+          <p:cNvSpPr>
+            <a:spLocks noGrp="1"/>
+          </p:cNvSpPr>
+          <p:nvPr>
+            <p:ph sz="half" idx="1"/>
+          </p:nvPr>
+        </p:nvSpPr>
+        <p:spPr>
+          <a:xfrm>
+            <a:off x="838199" y="1825625"/>
+            <a:ext cx="5901267" cy="4351338"/>
+          </a:xfrm>
+        </p:spPr>
+        <p:txBody>
+          <a:bodyPr>
+            <a:normAutofit fontScale="92500" lnSpcReduction="20000"/>
+          </a:bodyPr>
+          <a:lstStyle/>
+          <a:p>
+            <a:r>
+              <a:rPr lang="fr-FR" dirty="0"/>
+              <a:t>Plusieurs implémentations </a:t>
+            </a:r>
+            <a:r>
+              <a:rPr lang="fr-FR" dirty="0" smtClean="0"/>
+              <a:t>:</a:t>
             </a:r>
             <a:endParaRPr lang="fr-FR" dirty="0"/>
           </a:p>
-        </p:txBody>
-      </p:sp>
-      <p:sp>
-        <p:nvSpPr>
-          <p:cNvPr id="3" name="Espace réservé du contenu 2"/>
-          <p:cNvSpPr>
-            <a:spLocks noGrp="1"/>
-          </p:cNvSpPr>
-          <p:nvPr>
-            <p:ph idx="1"/>
-          </p:nvPr>
-        </p:nvSpPr>
-        <p:spPr/>
-        <p:txBody>
-          <a:bodyPr>
-            <a:normAutofit/>
-          </a:bodyPr>
-          <a:lstStyle/>
+          <a:p>
+            <a:endParaRPr lang="fr-FR" dirty="0"/>
+          </a:p>
           <a:p>
             <a:endParaRPr lang="fr-FR" dirty="0" smtClean="0"/>
           </a:p>
           <a:p>
-            <a:r>
-              <a:rPr lang="fr-FR" dirty="0" smtClean="0"/>
-              <a:t>Comme précédemment : disparition des données mais… progressive !</a:t>
-            </a:r>
-          </a:p>
-          <a:p>
             <a:endParaRPr lang="fr-FR" dirty="0"/>
           </a:p>
           <a:p>
-            <a:r>
-              <a:rPr lang="fr-FR" dirty="0" smtClean="0"/>
-              <a:t>Application à la géolocalisation : diminuer la précision des données stockées au fil du temps</a:t>
-            </a:r>
+            <a:endParaRPr lang="fr-FR" dirty="0" smtClean="0"/>
+          </a:p>
+          <a:p>
+            <a:endParaRPr lang="fr-FR" dirty="0" smtClean="0"/>
+          </a:p>
+          <a:p>
+            <a:endParaRPr lang="fr-FR" dirty="0"/>
+          </a:p>
+          <a:p>
+            <a:r>
+              <a:rPr lang="fr-FR" dirty="0" smtClean="0"/>
+              <a:t>Choix restants :</a:t>
+            </a:r>
+          </a:p>
+          <a:p>
+            <a:pPr lvl="1"/>
+            <a:r>
+              <a:rPr lang="fr-FR" dirty="0" smtClean="0"/>
+              <a:t>vampiriser </a:t>
+            </a:r>
+            <a:r>
+              <a:rPr lang="fr-FR" dirty="0"/>
+              <a:t>une DHT existante ou </a:t>
+            </a:r>
+            <a:r>
+              <a:rPr lang="fr-FR" dirty="0" smtClean="0"/>
+              <a:t>simuler</a:t>
+            </a:r>
+            <a:endParaRPr lang="fr-FR" dirty="0"/>
+          </a:p>
+          <a:p>
+            <a:pPr lvl="1"/>
+            <a:r>
+              <a:rPr lang="fr-FR" dirty="0"/>
+              <a:t>Compensation du risque</a:t>
+            </a:r>
+          </a:p>
+          <a:p>
+            <a:pPr lvl="2"/>
+            <a:r>
+              <a:rPr lang="fr-FR" dirty="0" smtClean="0"/>
+              <a:t>Magicien d’oz comme solution </a:t>
+            </a:r>
+            <a:r>
+              <a:rPr lang="fr-FR" dirty="0"/>
+              <a:t>de repli </a:t>
+            </a:r>
+          </a:p>
+          <a:p>
+            <a:endParaRPr lang="fr-FR" dirty="0"/>
+          </a:p>
+          <a:p>
+            <a:endParaRPr lang="fr-FR" dirty="0"/>
           </a:p>
           <a:p>
             <a:pPr lvl="1"/>
             <a:endParaRPr lang="fr-FR" dirty="0"/>
           </a:p>
-        </p:txBody>
-      </p:sp>
+          <a:p>
+            <a:endParaRPr lang="fr-FR" dirty="0"/>
+          </a:p>
+        </p:txBody>
+      </p:sp>
+      <p:sp>
+        <p:nvSpPr>
+          <p:cNvPr id="5" name="Espace réservé du numéro de diapositive 4"/>
+          <p:cNvSpPr>
+            <a:spLocks noGrp="1"/>
+          </p:cNvSpPr>
+          <p:nvPr>
+            <p:ph type="sldNum" sz="quarter" idx="12"/>
+          </p:nvPr>
+        </p:nvSpPr>
+        <p:spPr/>
+        <p:txBody>
+          <a:bodyPr/>
+          <a:lstStyle/>
+          <a:p>
+            <a:fld id="{36A212DA-347D-4853-A3E5-DB8AA592974E}" type="slidenum">
+              <a:rPr lang="fr-FR" smtClean="0"/>
+              <a:t>16</a:t>
+            </a:fld>
+            <a:endParaRPr lang="fr-FR"/>
+          </a:p>
+        </p:txBody>
+      </p:sp>
+      <p:sp>
+        <p:nvSpPr>
+          <p:cNvPr id="6" name="ZoneTexte 5"/>
+          <p:cNvSpPr txBox="1"/>
+          <p:nvPr/>
+        </p:nvSpPr>
+        <p:spPr>
+          <a:xfrm>
+            <a:off x="0" y="0"/>
+            <a:ext cx="4944752" cy="369332"/>
+          </a:xfrm>
+          <a:prstGeom prst="rect">
+            <a:avLst/>
+          </a:prstGeom>
+          <a:noFill/>
+        </p:spPr>
+        <p:txBody>
+          <a:bodyPr wrap="none" rtlCol="0">
+            <a:spAutoFit/>
+          </a:bodyPr>
+          <a:lstStyle/>
+          <a:p>
+            <a:r>
+              <a:rPr lang="fr-FR" dirty="0" smtClean="0"/>
+              <a:t>Exposé du problème -&gt; Solution -&gt; </a:t>
+            </a:r>
+            <a:r>
+              <a:rPr lang="fr-FR" b="1" dirty="0" smtClean="0"/>
+              <a:t>Notre approche</a:t>
+            </a:r>
+            <a:endParaRPr lang="fr-FR" b="1" dirty="0"/>
+          </a:p>
+        </p:txBody>
+      </p:sp>
+      <p:pic>
+        <p:nvPicPr>
+          <p:cNvPr id="7" name="Image 6"/>
+          <p:cNvPicPr>
+            <a:picLocks noChangeAspect="1"/>
+          </p:cNvPicPr>
+          <p:nvPr/>
+        </p:nvPicPr>
+        <p:blipFill>
+          <a:blip r:embed="rId2"/>
+          <a:stretch>
+            <a:fillRect/>
+          </a:stretch>
+        </p:blipFill>
+        <p:spPr>
+          <a:xfrm>
+            <a:off x="3454620" y="2197162"/>
+            <a:ext cx="7425318" cy="2594971"/>
+          </a:xfrm>
+          <a:prstGeom prst="rect">
+            <a:avLst/>
+          </a:prstGeom>
+        </p:spPr>
+      </p:pic>
     </p:spTree>
     <p:extLst>
       <p:ext uri="{BB962C8B-B14F-4D97-AF65-F5344CB8AC3E}">
-        <p14:creationId xmlns:p14="http://schemas.microsoft.com/office/powerpoint/2010/main" val="859945632"/>
+        <p14:creationId xmlns:p14="http://schemas.microsoft.com/office/powerpoint/2010/main" val="2327660550"/>
       </p:ext>
     </p:extLst>
   </p:cSld>
@@ -4364,7 +5763,7 @@
           <a:p>
             <a:r>
               <a:rPr lang="fr-FR" dirty="0" smtClean="0"/>
-              <a:t>Travail a exécuter</a:t>
+              <a:t>Limitations</a:t>
             </a:r>
             <a:endParaRPr lang="fr-FR" dirty="0"/>
           </a:p>
@@ -4387,19 +5786,129 @@
           </a:bodyPr>
           <a:lstStyle/>
           <a:p>
+            <a:r>
+              <a:rPr lang="fr-FR" dirty="0" smtClean="0"/>
+              <a:t>De l’idée</a:t>
+            </a:r>
+          </a:p>
+          <a:p>
             <a:pPr lvl="1"/>
             <a:r>
               <a:rPr lang="fr-FR" dirty="0" smtClean="0"/>
-              <a:t>Schéma cahier à reproduire</a:t>
-            </a:r>
+              <a:t>Modèle “honnête mais curieux”</a:t>
+            </a:r>
+          </a:p>
+          <a:p>
+            <a:pPr lvl="1"/>
+            <a:r>
+              <a:rPr lang="fr-FR" dirty="0" smtClean="0"/>
+              <a:t>Borne inf. à la durée de vie des données</a:t>
+            </a:r>
+          </a:p>
+          <a:p>
+            <a:pPr lvl="1"/>
+            <a:r>
+              <a:rPr lang="fr-FR" dirty="0" smtClean="0"/>
+              <a:t>Ne s’applique pas rétroactivement aux données déjà publiées</a:t>
+            </a:r>
+          </a:p>
+          <a:p>
+            <a:pPr lvl="1"/>
+            <a:r>
+              <a:rPr lang="fr-FR" dirty="0" smtClean="0"/>
+              <a:t>Difficulté de proposer un modèle de dégradation général</a:t>
+            </a:r>
+          </a:p>
+          <a:p>
+            <a:endParaRPr lang="fr-FR" dirty="0" smtClean="0"/>
+          </a:p>
+          <a:p>
+            <a:r>
+              <a:rPr lang="fr-FR" dirty="0" smtClean="0"/>
+              <a:t>De notre approche</a:t>
+            </a:r>
+          </a:p>
+          <a:p>
+            <a:pPr lvl="1"/>
+            <a:r>
+              <a:rPr lang="fr-FR" dirty="0" smtClean="0"/>
+              <a:t>Reste un risque : la mesure du </a:t>
+            </a:r>
+            <a:r>
+              <a:rPr lang="fr-FR" dirty="0" err="1" smtClean="0"/>
+              <a:t>churn</a:t>
+            </a:r>
+            <a:endParaRPr lang="fr-FR" dirty="0" smtClean="0"/>
+          </a:p>
+          <a:p>
+            <a:pPr marL="457200" lvl="1" indent="0">
+              <a:buNone/>
+            </a:pPr>
             <a:endParaRPr lang="fr-FR" dirty="0"/>
+          </a:p>
+        </p:txBody>
+      </p:sp>
+      <p:sp>
+        <p:nvSpPr>
+          <p:cNvPr id="4" name="ZoneTexte 3"/>
+          <p:cNvSpPr txBox="1"/>
+          <p:nvPr/>
+        </p:nvSpPr>
+        <p:spPr>
+          <a:xfrm>
+            <a:off x="0" y="0"/>
+            <a:ext cx="4944752" cy="369332"/>
+          </a:xfrm>
+          <a:prstGeom prst="rect">
+            <a:avLst/>
+          </a:prstGeom>
+          <a:noFill/>
+        </p:spPr>
+        <p:txBody>
+          <a:bodyPr wrap="none" rtlCol="0">
+            <a:spAutoFit/>
+          </a:bodyPr>
+          <a:lstStyle/>
+          <a:p>
+            <a:r>
+              <a:rPr lang="fr-FR" dirty="0" smtClean="0"/>
+              <a:t>Exposé du problème -&gt; Solution -&gt; </a:t>
+            </a:r>
+            <a:r>
+              <a:rPr lang="fr-FR" b="1" dirty="0" smtClean="0"/>
+              <a:t>Notre approche</a:t>
+            </a:r>
+            <a:endParaRPr lang="fr-FR" b="1" dirty="0"/>
+          </a:p>
+        </p:txBody>
+      </p:sp>
+      <p:sp>
+        <p:nvSpPr>
+          <p:cNvPr id="6" name="Espace réservé du numéro de diapositive 5"/>
+          <p:cNvSpPr>
+            <a:spLocks noGrp="1"/>
+          </p:cNvSpPr>
+          <p:nvPr>
+            <p:ph type="sldNum" sz="quarter" idx="12"/>
+          </p:nvPr>
+        </p:nvSpPr>
+        <p:spPr/>
+        <p:txBody>
+          <a:bodyPr/>
+          <a:lstStyle/>
+          <a:p>
+            <a:fld id="{36A212DA-347D-4853-A3E5-DB8AA592974E}" type="slidenum">
+              <a:rPr lang="fr-FR" smtClean="0"/>
+              <a:t>17</a:t>
+            </a:fld>
+            <a:endParaRPr lang="fr-FR"/>
           </a:p>
         </p:txBody>
       </p:sp>
     </p:spTree>
     <p:extLst>
       <p:ext uri="{BB962C8B-B14F-4D97-AF65-F5344CB8AC3E}">
-        <p14:creationId xmlns:p14="http://schemas.microsoft.com/office/powerpoint/2010/main" val="463361665"/>
+        <p14:creationId xmlns:p14="http://schemas.microsoft.com/office/powerpoint/2010/main" val="2324293040"/>
       </p:ext>
     </p:extLst>
   </p:cSld>
@@ -4443,7 +5952,7 @@
           <a:p>
             <a:r>
               <a:rPr lang="fr-FR" dirty="0" smtClean="0"/>
-              <a:t>Choix de la DHT</a:t>
+              <a:t>Des questions ?</a:t>
             </a:r>
             <a:endParaRPr lang="fr-FR" dirty="0"/>
           </a:p>
@@ -4466,117 +5975,36 @@
           </a:bodyPr>
           <a:lstStyle/>
           <a:p>
-            <a:pPr lvl="1"/>
             <a:r>
               <a:rPr lang="fr-FR" dirty="0" smtClean="0">
-                <a:solidFill>
-                  <a:srgbClr val="FF0000"/>
-                </a:solidFill>
+                <a:sym typeface="Wingdings" panose="05000000000000000000" pitchFamily="2" charset="2"/>
               </a:rPr>
-              <a:t>OU plutôt, du système P2P basé sur une DHT !</a:t>
-            </a:r>
-          </a:p>
-          <a:p>
-            <a:pPr lvl="1"/>
-            <a:endParaRPr lang="fr-FR" dirty="0"/>
-          </a:p>
-          <a:p>
-            <a:pPr lvl="1"/>
-            <a:r>
-              <a:rPr lang="en-US" dirty="0" smtClean="0"/>
-              <a:t>For </a:t>
-            </a:r>
-            <a:r>
-              <a:rPr lang="en-US" dirty="0" err="1" smtClean="0"/>
-              <a:t>Vuze</a:t>
-            </a:r>
-            <a:r>
-              <a:rPr lang="en-US" dirty="0" smtClean="0"/>
-              <a:t> architecture, the timeout is 8 hours and for </a:t>
-            </a:r>
-            <a:r>
-              <a:rPr lang="en-US" dirty="0" err="1" smtClean="0"/>
-              <a:t>OpenDHT</a:t>
-            </a:r>
-            <a:r>
-              <a:rPr lang="en-US" dirty="0" smtClean="0"/>
-              <a:t> [16]it is about a week.</a:t>
-            </a:r>
-            <a:endParaRPr lang="fr-FR" dirty="0"/>
-          </a:p>
-        </p:txBody>
-      </p:sp>
-    </p:spTree>
-    <p:extLst>
-      <p:ext uri="{BB962C8B-B14F-4D97-AF65-F5344CB8AC3E}">
-        <p14:creationId xmlns:p14="http://schemas.microsoft.com/office/powerpoint/2010/main" val="819210308"/>
-      </p:ext>
-    </p:extLst>
-  </p:cSld>
-  <p:clrMapOvr>
-    <a:masterClrMapping/>
-  </p:clrMapOvr>
-</p:sld>
-</file>
-
-<file path=ppt/slides/slide19.xml><?xml version="1.0" encoding="utf-8"?>
-<p:sld xmlns:a="http://schemas.openxmlformats.org/drawingml/2006/main" xmlns:r="http://schemas.openxmlformats.org/officeDocument/2006/relationships" xmlns:p="http://schemas.openxmlformats.org/presentationml/2006/main">
-  <p:cSld>
-    <p:spTree>
-      <p:nvGrpSpPr>
-        <p:cNvPr id="1" name=""/>
-        <p:cNvGrpSpPr/>
-        <p:nvPr/>
-      </p:nvGrpSpPr>
-      <p:grpSpPr>
-        <a:xfrm>
-          <a:off x="0" y="0"/>
-          <a:ext cx="0" cy="0"/>
-          <a:chOff x="0" y="0"/>
-          <a:chExt cx="0" cy="0"/>
-        </a:xfrm>
-      </p:grpSpPr>
-      <p:sp>
-        <p:nvSpPr>
-          <p:cNvPr id="2" name="Titre 1"/>
-          <p:cNvSpPr>
-            <a:spLocks noGrp="1"/>
-          </p:cNvSpPr>
-          <p:nvPr>
-            <p:ph type="title"/>
-          </p:nvPr>
-        </p:nvSpPr>
-        <p:spPr/>
-        <p:txBody>
-          <a:bodyPr/>
-          <a:lstStyle/>
-          <a:p>
-            <a:r>
-              <a:rPr lang="fr-FR" dirty="0" smtClean="0"/>
-              <a:t>Des questions ?</a:t>
-            </a:r>
-            <a:endParaRPr lang="fr-FR" dirty="0"/>
-          </a:p>
-        </p:txBody>
-      </p:sp>
-      <p:sp>
-        <p:nvSpPr>
-          <p:cNvPr id="3" name="Espace réservé du contenu 2"/>
-          <p:cNvSpPr>
-            <a:spLocks noGrp="1"/>
-          </p:cNvSpPr>
-          <p:nvPr>
-            <p:ph idx="1"/>
-          </p:nvPr>
-        </p:nvSpPr>
-        <p:spPr/>
-        <p:txBody>
-          <a:bodyPr>
-            <a:normAutofit/>
-          </a:bodyPr>
-          <a:lstStyle/>
-          <a:p>
+              <a:t> </a:t>
+            </a:r>
             <a:endParaRPr lang="fr-FR" dirty="0" smtClean="0"/>
+          </a:p>
+        </p:txBody>
+      </p:sp>
+      <p:sp>
+        <p:nvSpPr>
+          <p:cNvPr id="5" name="Espace réservé du numéro de diapositive 4"/>
+          <p:cNvSpPr>
+            <a:spLocks noGrp="1"/>
+          </p:cNvSpPr>
+          <p:nvPr>
+            <p:ph type="sldNum" sz="quarter" idx="12"/>
+          </p:nvPr>
+        </p:nvSpPr>
+        <p:spPr/>
+        <p:txBody>
+          <a:bodyPr/>
+          <a:lstStyle/>
+          <a:p>
+            <a:fld id="{36A212DA-347D-4853-A3E5-DB8AA592974E}" type="slidenum">
+              <a:rPr lang="fr-FR" smtClean="0"/>
+              <a:t>18</a:t>
+            </a:fld>
+            <a:endParaRPr lang="fr-FR"/>
           </a:p>
         </p:txBody>
       </p:sp>
@@ -4627,7 +6055,7 @@
           <a:p>
             <a:r>
               <a:rPr lang="fr-FR" dirty="0" smtClean="0"/>
-              <a:t>Introduction au partage de données</a:t>
+              <a:t>Plan de la présentation</a:t>
             </a:r>
             <a:endParaRPr lang="fr-FR" dirty="0"/>
           </a:p>
@@ -4635,31 +6063,126 @@
       </p:sp>
       <p:sp>
         <p:nvSpPr>
-          <p:cNvPr id="3" name="Espace réservé du texte 2"/>
-          <p:cNvSpPr>
-            <a:spLocks noGrp="1"/>
-          </p:cNvSpPr>
-          <p:nvPr>
-            <p:ph type="body" idx="1"/>
-          </p:nvPr>
-        </p:nvSpPr>
-        <p:spPr/>
-        <p:txBody>
-          <a:bodyPr/>
-          <a:lstStyle/>
-          <a:p>
-            <a:r>
-              <a:rPr lang="fr-FR" dirty="0" smtClean="0"/>
-              <a:t>Quelques connaissances techniques</a:t>
-            </a:r>
+          <p:cNvPr id="3" name="Espace réservé du contenu 2"/>
+          <p:cNvSpPr>
+            <a:spLocks noGrp="1"/>
+          </p:cNvSpPr>
+          <p:nvPr>
+            <p:ph idx="1"/>
+          </p:nvPr>
+        </p:nvSpPr>
+        <p:spPr/>
+        <p:txBody>
+          <a:bodyPr>
+            <a:normAutofit/>
+          </a:bodyPr>
+          <a:lstStyle/>
+          <a:p>
+            <a:r>
+              <a:rPr lang="fr-FR" dirty="0"/>
+              <a:t>Exposé du p</a:t>
+            </a:r>
+            <a:r>
+              <a:rPr lang="fr-FR" dirty="0" smtClean="0"/>
+              <a:t>roblème</a:t>
+            </a:r>
+          </a:p>
+          <a:p>
+            <a:pPr lvl="1"/>
+            <a:r>
+              <a:rPr lang="fr-FR" dirty="0" smtClean="0"/>
+              <a:t>les </a:t>
+            </a:r>
+            <a:r>
+              <a:rPr lang="fr-FR" dirty="0"/>
+              <a:t>données existent </a:t>
+            </a:r>
+            <a:r>
+              <a:rPr lang="fr-FR" dirty="0" smtClean="0"/>
+              <a:t>indéfiniment</a:t>
+            </a:r>
+          </a:p>
+          <a:p>
             <a:endParaRPr lang="fr-FR" dirty="0"/>
+          </a:p>
+          <a:p>
+            <a:r>
+              <a:rPr lang="fr-FR" dirty="0"/>
+              <a:t>Une </a:t>
+            </a:r>
+            <a:r>
+              <a:rPr lang="fr-FR" dirty="0" smtClean="0"/>
+              <a:t>solution</a:t>
+            </a:r>
+          </a:p>
+          <a:p>
+            <a:pPr lvl="1"/>
+            <a:r>
+              <a:rPr lang="fr-FR" dirty="0" smtClean="0"/>
+              <a:t>la </a:t>
+            </a:r>
+            <a:r>
+              <a:rPr lang="fr-FR" dirty="0"/>
+              <a:t>publication </a:t>
+            </a:r>
+            <a:r>
+              <a:rPr lang="fr-FR" dirty="0" smtClean="0"/>
+              <a:t>éphémère</a:t>
+            </a:r>
+          </a:p>
+          <a:p>
+            <a:endParaRPr lang="fr-FR" dirty="0"/>
+          </a:p>
+          <a:p>
+            <a:r>
+              <a:rPr lang="fr-FR" dirty="0"/>
+              <a:t>Notre </a:t>
+            </a:r>
+            <a:r>
+              <a:rPr lang="fr-FR" dirty="0" smtClean="0"/>
+              <a:t>approche</a:t>
+            </a:r>
+          </a:p>
+          <a:p>
+            <a:pPr lvl="1"/>
+            <a:r>
+              <a:rPr lang="fr-FR" dirty="0" smtClean="0"/>
+              <a:t>application </a:t>
+            </a:r>
+            <a:r>
+              <a:rPr lang="fr-FR" dirty="0"/>
+              <a:t>à la dégradation de données de géolocalisation</a:t>
+            </a:r>
+          </a:p>
+        </p:txBody>
+      </p:sp>
+      <p:sp>
+        <p:nvSpPr>
+          <p:cNvPr id="5" name="Espace réservé du numéro de diapositive 4"/>
+          <p:cNvSpPr>
+            <a:spLocks noGrp="1"/>
+          </p:cNvSpPr>
+          <p:nvPr>
+            <p:ph type="sldNum" sz="quarter" idx="12"/>
+          </p:nvPr>
+        </p:nvSpPr>
+        <p:spPr/>
+        <p:txBody>
+          <a:bodyPr/>
+          <a:lstStyle/>
+          <a:p>
+            <a:fld id="{36A212DA-347D-4853-A3E5-DB8AA592974E}" type="slidenum">
+              <a:rPr lang="fr-FR" smtClean="0"/>
+              <a:t>2</a:t>
+            </a:fld>
+            <a:endParaRPr lang="fr-FR"/>
           </a:p>
         </p:txBody>
       </p:sp>
     </p:spTree>
     <p:extLst>
       <p:ext uri="{BB962C8B-B14F-4D97-AF65-F5344CB8AC3E}">
-        <p14:creationId xmlns:p14="http://schemas.microsoft.com/office/powerpoint/2010/main" val="425077358"/>
+        <p14:creationId xmlns:p14="http://schemas.microsoft.com/office/powerpoint/2010/main" val="2801839511"/>
       </p:ext>
     </p:extLst>
   </p:cSld>
@@ -4703,7 +6226,11 @@
           <a:p>
             <a:r>
               <a:rPr lang="fr-FR" dirty="0" smtClean="0"/>
-              <a:t>Introduction</a:t>
+              <a:t>Les </a:t>
+            </a:r>
+            <a:r>
+              <a:rPr lang="fr-FR" dirty="0"/>
+              <a:t>données existent indéfiniment</a:t>
             </a:r>
             <a:endParaRPr lang="fr-FR" dirty="0"/>
           </a:p>
@@ -4721,33 +6248,174 @@
         </p:nvSpPr>
         <p:spPr/>
         <p:txBody>
-          <a:bodyPr/>
-          <a:lstStyle/>
-          <a:p>
+          <a:bodyPr>
+            <a:normAutofit fontScale="92500" lnSpcReduction="10000"/>
+          </a:bodyPr>
+          <a:lstStyle/>
+          <a:p>
+            <a:r>
+              <a:rPr lang="fr-FR" dirty="0" smtClean="0"/>
+              <a:t>Aucune </a:t>
+            </a:r>
+            <a:r>
+              <a:rPr lang="fr-FR" dirty="0" smtClean="0"/>
+              <a:t>incitation pour l’hébergeur</a:t>
+            </a:r>
             <a:endParaRPr lang="fr-FR" dirty="0" smtClean="0"/>
           </a:p>
           <a:p>
-            <a:r>
-              <a:rPr lang="fr-FR" dirty="0" smtClean="0"/>
-              <a:t>Actualité : évolution en direction de systèmes de données distribués et de partage de données</a:t>
-            </a:r>
-          </a:p>
-          <a:p>
+            <a:pPr lvl="1"/>
+            <a:r>
+              <a:rPr lang="fr-FR" dirty="0" smtClean="0"/>
+              <a:t>La capacité de stockage disponible est illimitée</a:t>
+            </a:r>
+          </a:p>
+          <a:p>
+            <a:pPr lvl="1"/>
+            <a:r>
+              <a:rPr lang="fr-FR" dirty="0" smtClean="0"/>
+              <a:t>De nombreux « services » veulent </a:t>
+            </a:r>
+            <a:r>
+              <a:rPr lang="fr-FR" dirty="0" smtClean="0"/>
+              <a:t>valoriser les données qu’ils collectent</a:t>
+            </a:r>
+            <a:endParaRPr lang="fr-FR" dirty="0" smtClean="0"/>
+          </a:p>
+          <a:p>
+            <a:pPr lvl="1"/>
             <a:endParaRPr lang="fr-FR" dirty="0"/>
           </a:p>
           <a:p>
             <a:r>
               <a:rPr lang="fr-FR" dirty="0" smtClean="0"/>
-              <a:t>Au cœur de ces systèmes : les tables de hachage distribuées (DHT)</a:t>
-            </a:r>
+              <a:t>Aucune </a:t>
+            </a:r>
+            <a:r>
+              <a:rPr lang="fr-FR" dirty="0" smtClean="0"/>
+              <a:t>responsabilité de l’utilisateur</a:t>
+            </a:r>
+            <a:endParaRPr lang="fr-FR" dirty="0" smtClean="0"/>
+          </a:p>
+          <a:p>
+            <a:pPr lvl="1"/>
+            <a:r>
+              <a:rPr lang="fr-FR" dirty="0" smtClean="0"/>
+              <a:t>Les utilisateurs ont abandonné le contrôle sur leur données</a:t>
+            </a:r>
+          </a:p>
+          <a:p>
+            <a:pPr lvl="1"/>
             <a:endParaRPr lang="fr-FR" dirty="0"/>
+          </a:p>
+          <a:p>
+            <a:r>
+              <a:rPr lang="fr-FR" dirty="0" smtClean="0"/>
+              <a:t>Absence d’une relation de confiance </a:t>
+            </a:r>
+            <a:r>
+              <a:rPr lang="fr-FR" dirty="0" smtClean="0"/>
+              <a:t>entre </a:t>
+            </a:r>
+            <a:r>
+              <a:rPr lang="fr-FR" dirty="0" smtClean="0"/>
+              <a:t>ces deux acteurs</a:t>
+            </a:r>
+          </a:p>
+          <a:p>
+            <a:endParaRPr lang="fr-FR" dirty="0"/>
+          </a:p>
+          <a:p>
+            <a:r>
+              <a:rPr lang="fr-FR" dirty="0" smtClean="0"/>
+              <a:t>Attaque rétroactive</a:t>
+            </a:r>
+          </a:p>
+          <a:p>
+            <a:pPr lvl="1"/>
+            <a:r>
+              <a:rPr lang="fr-FR" dirty="0"/>
+              <a:t>Des données peuvent ressurgir après leur supposé effacement</a:t>
+            </a:r>
+          </a:p>
+          <a:p>
+            <a:pPr lvl="1"/>
+            <a:endParaRPr lang="fr-FR" dirty="0" smtClean="0"/>
+          </a:p>
+          <a:p>
+            <a:pPr lvl="1"/>
+            <a:endParaRPr lang="fr-FR" dirty="0" smtClean="0"/>
+          </a:p>
+          <a:p>
+            <a:endParaRPr lang="fr-FR" dirty="0" smtClean="0"/>
+          </a:p>
+          <a:p>
+            <a:pPr lvl="1"/>
+            <a:endParaRPr lang="fr-FR" dirty="0"/>
+          </a:p>
+        </p:txBody>
+      </p:sp>
+      <p:sp>
+        <p:nvSpPr>
+          <p:cNvPr id="4" name="ZoneTexte 3"/>
+          <p:cNvSpPr txBox="1"/>
+          <p:nvPr/>
+        </p:nvSpPr>
+        <p:spPr>
+          <a:xfrm>
+            <a:off x="0" y="0"/>
+            <a:ext cx="4944752" cy="369332"/>
+          </a:xfrm>
+          <a:prstGeom prst="rect">
+            <a:avLst/>
+          </a:prstGeom>
+          <a:noFill/>
+        </p:spPr>
+        <p:txBody>
+          <a:bodyPr wrap="none" rtlCol="0">
+            <a:spAutoFit/>
+          </a:bodyPr>
+          <a:lstStyle/>
+          <a:p>
+            <a:r>
+              <a:rPr lang="fr-FR" b="1" dirty="0" smtClean="0"/>
+              <a:t>Exposé du problème </a:t>
+            </a:r>
+            <a:r>
+              <a:rPr lang="fr-FR" dirty="0" smtClean="0"/>
+              <a:t>-&gt; Solution -&gt; Notre approche</a:t>
+            </a:r>
+            <a:endParaRPr lang="fr-FR" dirty="0"/>
+          </a:p>
+        </p:txBody>
+      </p:sp>
+      <p:sp>
+        <p:nvSpPr>
+          <p:cNvPr id="6" name="Espace réservé du numéro de diapositive 5"/>
+          <p:cNvSpPr>
+            <a:spLocks noGrp="1"/>
+          </p:cNvSpPr>
+          <p:nvPr>
+            <p:ph type="sldNum" sz="quarter" idx="12"/>
+          </p:nvPr>
+        </p:nvSpPr>
+        <p:spPr/>
+        <p:txBody>
+          <a:bodyPr/>
+          <a:lstStyle/>
+          <a:p>
+            <a:fld id="{36A212DA-347D-4853-A3E5-DB8AA592974E}" type="slidenum">
+              <a:rPr lang="fr-FR" smtClean="0"/>
+              <a:t>3</a:t>
+            </a:fld>
+            <a:endParaRPr lang="fr-FR"/>
           </a:p>
         </p:txBody>
       </p:sp>
     </p:spTree>
     <p:extLst>
       <p:ext uri="{BB962C8B-B14F-4D97-AF65-F5344CB8AC3E}">
-        <p14:creationId xmlns:p14="http://schemas.microsoft.com/office/powerpoint/2010/main" val="3824602052"/>
+        <p14:creationId xmlns:p14="http://schemas.microsoft.com/office/powerpoint/2010/main" val="1677475312"/>
       </p:ext>
     </p:extLst>
   </p:cSld>
@@ -4791,7 +6459,7 @@
           <a:p>
             <a:r>
               <a:rPr lang="fr-FR" dirty="0" smtClean="0"/>
-              <a:t>Introduction aux DHT</a:t>
+              <a:t>Une solution : la publication éphémère</a:t>
             </a:r>
             <a:endParaRPr lang="fr-FR" dirty="0"/>
           </a:p>
@@ -4799,115 +6467,50 @@
       </p:sp>
       <p:sp>
         <p:nvSpPr>
-          <p:cNvPr id="3" name="Espace réservé du contenu 2"/>
-          <p:cNvSpPr>
-            <a:spLocks noGrp="1"/>
-          </p:cNvSpPr>
-          <p:nvPr>
-            <p:ph idx="1"/>
-          </p:nvPr>
-        </p:nvSpPr>
-        <p:spPr/>
-        <p:txBody>
-          <a:bodyPr>
-            <a:normAutofit/>
-          </a:bodyPr>
-          <a:lstStyle/>
-          <a:p>
-            <a:r>
-              <a:rPr lang="fr-FR" dirty="0" smtClean="0"/>
-              <a:t>Table de hachage</a:t>
-            </a:r>
-          </a:p>
-          <a:p>
-            <a:pPr lvl="1"/>
-            <a:r>
-              <a:rPr lang="fr-FR" dirty="0" smtClean="0"/>
-              <a:t>Structure de données qui associe des clés à des valeurs</a:t>
-            </a:r>
-          </a:p>
-          <a:p>
-            <a:pPr lvl="1"/>
-            <a:r>
-              <a:rPr lang="fr-FR" dirty="0" smtClean="0"/>
-              <a:t>Interface très simple : put(key, value), value = </a:t>
-            </a:r>
-            <a:r>
-              <a:rPr lang="fr-FR" dirty="0" err="1" smtClean="0"/>
-              <a:t>get</a:t>
-            </a:r>
-            <a:r>
-              <a:rPr lang="fr-FR" dirty="0" smtClean="0"/>
-              <a:t>(key)</a:t>
-            </a:r>
-          </a:p>
-          <a:p>
-            <a:pPr lvl="2"/>
-            <a:endParaRPr lang="fr-FR" dirty="0"/>
-          </a:p>
-          <a:p>
-            <a:r>
-              <a:rPr lang="fr-FR" dirty="0" smtClean="0"/>
-              <a:t>DHT</a:t>
-            </a:r>
-          </a:p>
-          <a:p>
-            <a:pPr lvl="1"/>
-            <a:r>
-              <a:rPr lang="fr-FR" dirty="0" smtClean="0"/>
-              <a:t>Même chose, la table étant distribuée entre de nombreux hôtes</a:t>
-            </a:r>
-          </a:p>
-          <a:p>
-            <a:pPr lvl="1"/>
-            <a:r>
-              <a:rPr lang="fr-FR" dirty="0" smtClean="0"/>
-              <a:t>Principe</a:t>
-            </a:r>
-          </a:p>
-          <a:p>
-            <a:pPr lvl="2"/>
-            <a:r>
-              <a:rPr lang="fr-FR" dirty="0" smtClean="0"/>
-              <a:t>Chaque nœud s’occupe de segments contigus de l’espace de clés</a:t>
-            </a:r>
-          </a:p>
-          <a:p>
-            <a:pPr lvl="2"/>
-            <a:r>
-              <a:rPr lang="fr-FR" dirty="0" smtClean="0"/>
-              <a:t>Tout nœud peut diriger les messages au nœud responsable de la clé recherchée</a:t>
-            </a:r>
-          </a:p>
-          <a:p>
-            <a:pPr lvl="1"/>
-            <a:r>
-              <a:rPr lang="fr-FR" dirty="0" smtClean="0"/>
-              <a:t>Une myriade d’algorithmes: </a:t>
-            </a:r>
-            <a:r>
-              <a:rPr lang="fr-FR" dirty="0" err="1" smtClean="0"/>
-              <a:t>Kademlia</a:t>
-            </a:r>
-            <a:r>
-              <a:rPr lang="fr-FR" dirty="0" smtClean="0"/>
-              <a:t>, </a:t>
-            </a:r>
-            <a:r>
-              <a:rPr lang="fr-FR" dirty="0" err="1" smtClean="0"/>
-              <a:t>Chord</a:t>
-            </a:r>
-            <a:r>
-              <a:rPr lang="fr-FR" dirty="0" smtClean="0"/>
-              <a:t>, GIMP, etc.</a:t>
-            </a:r>
+          <p:cNvPr id="3" name="Espace réservé du texte 2"/>
+          <p:cNvSpPr>
+            <a:spLocks noGrp="1"/>
+          </p:cNvSpPr>
+          <p:nvPr>
+            <p:ph type="body" idx="1"/>
+          </p:nvPr>
+        </p:nvSpPr>
+        <p:spPr/>
+        <p:txBody>
+          <a:bodyPr/>
+          <a:lstStyle/>
+          <a:p>
+            <a:endParaRPr lang="fr-FR"/>
+          </a:p>
+        </p:txBody>
+      </p:sp>
+      <p:sp>
+        <p:nvSpPr>
+          <p:cNvPr id="5" name="Espace réservé du numéro de diapositive 4"/>
+          <p:cNvSpPr>
+            <a:spLocks noGrp="1"/>
+          </p:cNvSpPr>
+          <p:nvPr>
+            <p:ph type="sldNum" sz="quarter" idx="12"/>
+          </p:nvPr>
+        </p:nvSpPr>
+        <p:spPr/>
+        <p:txBody>
+          <a:bodyPr/>
+          <a:lstStyle/>
+          <a:p>
+            <a:fld id="{36A212DA-347D-4853-A3E5-DB8AA592974E}" type="slidenum">
+              <a:rPr lang="fr-FR" smtClean="0"/>
+              <a:t>4</a:t>
+            </a:fld>
+            <a:endParaRPr lang="fr-FR"/>
           </a:p>
         </p:txBody>
       </p:sp>
     </p:spTree>
     <p:extLst>
       <p:ext uri="{BB962C8B-B14F-4D97-AF65-F5344CB8AC3E}">
-        <p14:creationId xmlns:p14="http://schemas.microsoft.com/office/powerpoint/2010/main" val="1223733745"/>
+        <p14:creationId xmlns:p14="http://schemas.microsoft.com/office/powerpoint/2010/main" val="338398204"/>
       </p:ext>
     </p:extLst>
   </p:cSld>
@@ -4951,7 +6554,7 @@
           <a:p>
             <a:r>
               <a:rPr lang="fr-FR" dirty="0" smtClean="0"/>
-              <a:t>Intérêt des DHT</a:t>
+              <a:t>Objectif</a:t>
             </a:r>
             <a:endParaRPr lang="fr-FR" dirty="0"/>
           </a:p>
@@ -4970,28 +6573,27 @@
         <p:spPr/>
         <p:txBody>
           <a:bodyPr>
-            <a:normAutofit fontScale="92500" lnSpcReduction="10000"/>
+            <a:normAutofit/>
           </a:bodyPr>
           <a:lstStyle/>
           <a:p>
-            <a:r>
-              <a:rPr lang="fr-FR" dirty="0" smtClean="0"/>
-              <a:t>Efficaces</a:t>
+            <a:endParaRPr lang="fr-FR" dirty="0" smtClean="0"/>
+          </a:p>
+          <a:p>
+            <a:r>
+              <a:rPr lang="fr-FR" dirty="0" smtClean="0"/>
+              <a:t>Donner </a:t>
+            </a:r>
+            <a:r>
+              <a:rPr lang="fr-FR" dirty="0" smtClean="0"/>
+              <a:t>à l’utilisateur le contrôle sur la durée de vie de ses données</a:t>
             </a:r>
           </a:p>
           <a:p>
             <a:pPr lvl="1"/>
             <a:r>
               <a:rPr lang="fr-FR" dirty="0" smtClean="0"/>
-              <a:t>Recherche en O(</a:t>
-            </a:r>
-            <a:r>
-              <a:rPr lang="fr-FR" dirty="0" err="1" smtClean="0"/>
-              <a:t>logN</a:t>
-            </a:r>
-            <a:r>
-              <a:rPr lang="fr-FR" dirty="0" smtClean="0"/>
-              <a:t>)</a:t>
+              <a:t>Après un laps de temps, toutes les copies de la données doivent être illisibles</a:t>
             </a:r>
           </a:p>
           <a:p>
@@ -4999,58 +6601,114 @@
             <a:endParaRPr lang="fr-FR" dirty="0"/>
           </a:p>
           <a:p>
-            <a:r>
-              <a:rPr lang="fr-FR" dirty="0" smtClean="0"/>
-              <a:t>Passage à l’échelle</a:t>
+            <a:endParaRPr lang="fr-FR" dirty="0" smtClean="0"/>
+          </a:p>
+          <a:p>
+            <a:r>
+              <a:rPr lang="fr-FR" dirty="0" smtClean="0"/>
+              <a:t>Une solution : les DHT</a:t>
             </a:r>
           </a:p>
           <a:p>
             <a:pPr lvl="1"/>
             <a:r>
               <a:rPr lang="fr-FR" dirty="0" smtClean="0"/>
-              <a:t>Très robuste par rapport à la disparition des nœuds</a:t>
+              <a:t>Au cœur des systèmes de partage de données</a:t>
             </a:r>
           </a:p>
           <a:p>
             <a:pPr lvl="1"/>
             <a:r>
-              <a:rPr lang="fr-FR" dirty="0" smtClean="0"/>
-              <a:t>Réplication des données</a:t>
-            </a:r>
+              <a:rPr lang="fr-FR" dirty="0"/>
+              <a:t>Table de </a:t>
+            </a:r>
+            <a:r>
+              <a:rPr lang="fr-FR" dirty="0" smtClean="0"/>
+              <a:t>hachage = Dictionnaire</a:t>
+            </a:r>
+            <a:endParaRPr lang="fr-FR" dirty="0"/>
           </a:p>
           <a:p>
             <a:pPr lvl="1"/>
+            <a:endParaRPr lang="fr-FR" dirty="0" smtClean="0"/>
+          </a:p>
+          <a:p>
+            <a:pPr lvl="1"/>
+            <a:endParaRPr lang="fr-FR" dirty="0" smtClean="0"/>
+          </a:p>
+          <a:p>
+            <a:pPr marL="457200" lvl="1" indent="0">
+              <a:buNone/>
+            </a:pPr>
+            <a:endParaRPr lang="fr-FR" dirty="0" smtClean="0"/>
+          </a:p>
+        </p:txBody>
+      </p:sp>
+      <p:sp>
+        <p:nvSpPr>
+          <p:cNvPr id="4" name="ZoneTexte 3"/>
+          <p:cNvSpPr txBox="1"/>
+          <p:nvPr/>
+        </p:nvSpPr>
+        <p:spPr>
+          <a:xfrm>
+            <a:off x="0" y="0"/>
+            <a:ext cx="4944752" cy="369332"/>
+          </a:xfrm>
+          <a:prstGeom prst="rect">
+            <a:avLst/>
+          </a:prstGeom>
+          <a:noFill/>
+        </p:spPr>
+        <p:txBody>
+          <a:bodyPr wrap="none" rtlCol="0">
+            <a:spAutoFit/>
+          </a:bodyPr>
+          <a:lstStyle/>
+          <a:p>
+            <a:r>
+              <a:rPr lang="fr-FR" dirty="0" smtClean="0"/>
+              <a:t>Exposé du problème -&gt; </a:t>
+            </a:r>
+            <a:r>
+              <a:rPr lang="fr-FR" b="1" dirty="0" smtClean="0"/>
+              <a:t>Solution</a:t>
+            </a:r>
+            <a:r>
+              <a:rPr lang="fr-FR" dirty="0" smtClean="0"/>
+              <a:t> -&gt; Notre approche</a:t>
+            </a:r>
             <a:endParaRPr lang="fr-FR" dirty="0"/>
           </a:p>
-          <a:p>
-            <a:r>
-              <a:rPr lang="fr-FR" dirty="0" smtClean="0"/>
-              <a:t>Aucun point central de contrôle</a:t>
-            </a:r>
-          </a:p>
-          <a:p>
-            <a:endParaRPr lang="fr-FR" dirty="0"/>
-          </a:p>
-          <a:p>
-            <a:r>
-              <a:rPr lang="fr-FR" dirty="0" smtClean="0"/>
-              <a:t>Équilibre de charge</a:t>
-            </a:r>
-          </a:p>
-          <a:p>
-            <a:pPr lvl="1"/>
-            <a:r>
-              <a:rPr lang="fr-FR" dirty="0" smtClean="0"/>
-              <a:t>Tous les nœuds naissent libres et égaux</a:t>
-            </a:r>
-            <a:endParaRPr lang="fr-FR" dirty="0"/>
+        </p:txBody>
+      </p:sp>
+      <p:sp>
+        <p:nvSpPr>
+          <p:cNvPr id="6" name="Espace réservé du numéro de diapositive 5"/>
+          <p:cNvSpPr>
+            <a:spLocks noGrp="1"/>
+          </p:cNvSpPr>
+          <p:nvPr>
+            <p:ph type="sldNum" sz="quarter" idx="12"/>
+          </p:nvPr>
+        </p:nvSpPr>
+        <p:spPr/>
+        <p:txBody>
+          <a:bodyPr/>
+          <a:lstStyle/>
+          <a:p>
+            <a:fld id="{36A212DA-347D-4853-A3E5-DB8AA592974E}" type="slidenum">
+              <a:rPr lang="fr-FR" smtClean="0"/>
+              <a:t>5</a:t>
+            </a:fld>
+            <a:endParaRPr lang="fr-FR"/>
           </a:p>
         </p:txBody>
       </p:sp>
     </p:spTree>
     <p:extLst>
       <p:ext uri="{BB962C8B-B14F-4D97-AF65-F5344CB8AC3E}">
-        <p14:creationId xmlns:p14="http://schemas.microsoft.com/office/powerpoint/2010/main" val="3863875811"/>
+        <p14:creationId xmlns:p14="http://schemas.microsoft.com/office/powerpoint/2010/main" val="2882096277"/>
       </p:ext>
     </p:extLst>
   </p:cSld>
@@ -5094,7 +6752,11 @@
           <a:p>
             <a:r>
               <a:rPr lang="fr-FR" dirty="0" smtClean="0"/>
-              <a:t>DHT et P2P</a:t>
+              <a:t>Introduction aux </a:t>
+            </a:r>
+            <a:r>
+              <a:rPr lang="fr-FR" dirty="0" smtClean="0"/>
+              <a:t>DHT (1/2)</a:t>
             </a:r>
             <a:endParaRPr lang="fr-FR" dirty="0"/>
           </a:p>
@@ -5113,23 +6775,72 @@
         <p:spPr/>
         <p:txBody>
           <a:bodyPr>
-            <a:normAutofit/>
+            <a:normAutofit lnSpcReduction="10000"/>
           </a:bodyPr>
           <a:lstStyle/>
           <a:p>
-            <a:endParaRPr lang="fr-FR" dirty="0" smtClean="0"/>
-          </a:p>
-          <a:p>
-            <a:r>
-              <a:rPr lang="fr-FR" dirty="0" smtClean="0"/>
-              <a:t>P2P</a:t>
+            <a:r>
+              <a:rPr lang="fr-FR" dirty="0" smtClean="0"/>
+              <a:t>DHT</a:t>
             </a:r>
           </a:p>
           <a:p>
             <a:pPr lvl="1"/>
             <a:r>
               <a:rPr lang="fr-FR" dirty="0" smtClean="0"/>
-              <a:t>Système d’ordinateurs partageant une partie de leurs ressources sans intermédiaire</a:t>
+              <a:t>Table </a:t>
+            </a:r>
+            <a:r>
+              <a:rPr lang="fr-FR" dirty="0" smtClean="0"/>
+              <a:t>de hachage distribuée entre de nombreux hôtes</a:t>
+            </a:r>
+          </a:p>
+          <a:p>
+            <a:pPr lvl="1"/>
+            <a:r>
+              <a:rPr lang="fr-FR" dirty="0" smtClean="0"/>
+              <a:t>Principe</a:t>
+            </a:r>
+          </a:p>
+          <a:p>
+            <a:pPr lvl="2"/>
+            <a:r>
+              <a:rPr lang="fr-FR" dirty="0" smtClean="0"/>
+              <a:t>Chaque nœud s’occupe de segments contigus de l’espace de clés</a:t>
+            </a:r>
+          </a:p>
+          <a:p>
+            <a:pPr lvl="2"/>
+            <a:r>
+              <a:rPr lang="fr-FR" dirty="0" smtClean="0"/>
+              <a:t>Tout nœud tente de diriger les messages vers le nœud responsable de la clé recherchée</a:t>
+            </a:r>
+          </a:p>
+          <a:p>
+            <a:pPr lvl="1"/>
+            <a:r>
+              <a:rPr lang="fr-FR" dirty="0" smtClean="0"/>
+              <a:t>Une myriade d’algorithmes: </a:t>
+            </a:r>
+            <a:r>
+              <a:rPr lang="fr-FR" dirty="0" err="1" smtClean="0"/>
+              <a:t>Kademlia</a:t>
+            </a:r>
+            <a:r>
+              <a:rPr lang="fr-FR" dirty="0" smtClean="0"/>
+              <a:t>, </a:t>
+            </a:r>
+            <a:r>
+              <a:rPr lang="fr-FR" dirty="0" err="1" smtClean="0"/>
+              <a:t>Chord</a:t>
+            </a:r>
+            <a:r>
+              <a:rPr lang="fr-FR" dirty="0" smtClean="0"/>
+              <a:t>, GIMP, etc</a:t>
+            </a:r>
+            <a:r>
+              <a:rPr lang="fr-FR" dirty="0" smtClean="0"/>
+              <a:t>.</a:t>
             </a:r>
           </a:p>
           <a:p>
@@ -5139,16 +6850,125 @@
           <a:p>
             <a:r>
               <a:rPr lang="fr-FR" dirty="0" smtClean="0"/>
-              <a:t>Beaucoup de systèmes P2P sont organisés en DHT</a:t>
-            </a:r>
+              <a:t>Intérêt</a:t>
+            </a:r>
+          </a:p>
+          <a:p>
+            <a:pPr lvl="1"/>
+            <a:r>
+              <a:rPr lang="fr-FR" dirty="0"/>
+              <a:t>Pas de contrôle </a:t>
+            </a:r>
+            <a:r>
+              <a:rPr lang="fr-FR" dirty="0" smtClean="0"/>
+              <a:t>centralisé</a:t>
+            </a:r>
+          </a:p>
+          <a:p>
+            <a:pPr lvl="1"/>
+            <a:r>
+              <a:rPr lang="fr-FR" dirty="0" smtClean="0"/>
+              <a:t>Efficaces : Recherche </a:t>
+            </a:r>
+            <a:r>
+              <a:rPr lang="fr-FR" dirty="0"/>
+              <a:t>en O(</a:t>
+            </a:r>
+            <a:r>
+              <a:rPr lang="fr-FR" dirty="0" err="1"/>
+              <a:t>logN</a:t>
+            </a:r>
+            <a:r>
+              <a:rPr lang="fr-FR" dirty="0" smtClean="0"/>
+              <a:t>)</a:t>
+            </a:r>
+          </a:p>
+          <a:p>
+            <a:pPr lvl="1"/>
+            <a:r>
+              <a:rPr lang="fr-FR" dirty="0"/>
+              <a:t>Nombreuses implémentations et facilité d’interface</a:t>
+            </a:r>
+          </a:p>
+          <a:p>
+            <a:pPr lvl="1"/>
             <a:endParaRPr lang="fr-FR" dirty="0"/>
+          </a:p>
+          <a:p>
+            <a:pPr lvl="1"/>
+            <a:endParaRPr lang="fr-FR" dirty="0"/>
+          </a:p>
+          <a:p>
+            <a:pPr lvl="1"/>
+            <a:endParaRPr lang="fr-FR" dirty="0" smtClean="0"/>
+          </a:p>
+        </p:txBody>
+      </p:sp>
+      <p:sp>
+        <p:nvSpPr>
+          <p:cNvPr id="4" name="ZoneTexte 3"/>
+          <p:cNvSpPr txBox="1"/>
+          <p:nvPr/>
+        </p:nvSpPr>
+        <p:spPr>
+          <a:xfrm>
+            <a:off x="0" y="0"/>
+            <a:ext cx="4944752" cy="369332"/>
+          </a:xfrm>
+          <a:prstGeom prst="rect">
+            <a:avLst/>
+          </a:prstGeom>
+          <a:noFill/>
+        </p:spPr>
+        <p:txBody>
+          <a:bodyPr wrap="none" rtlCol="0">
+            <a:spAutoFit/>
+          </a:bodyPr>
+          <a:lstStyle/>
+          <a:p>
+            <a:r>
+              <a:rPr lang="fr-FR" dirty="0" smtClean="0"/>
+              <a:t>Exposé du problème -&gt; </a:t>
+            </a:r>
+            <a:r>
+              <a:rPr lang="fr-FR" b="1" dirty="0" smtClean="0"/>
+              <a:t>Solution</a:t>
+            </a:r>
+            <a:r>
+              <a:rPr lang="fr-FR" dirty="0" smtClean="0"/>
+              <a:t> -&gt; Notre approche</a:t>
+            </a:r>
+            <a:endParaRPr lang="fr-FR" dirty="0"/>
+          </a:p>
+        </p:txBody>
+      </p:sp>
+      <p:sp>
+        <p:nvSpPr>
+          <p:cNvPr id="6" name="Espace réservé du numéro de diapositive 5"/>
+          <p:cNvSpPr>
+            <a:spLocks noGrp="1"/>
+          </p:cNvSpPr>
+          <p:nvPr>
+            <p:ph type="sldNum" sz="quarter" idx="12"/>
+          </p:nvPr>
+        </p:nvSpPr>
+        <p:spPr/>
+        <p:txBody>
+          <a:bodyPr/>
+          <a:lstStyle/>
+          <a:p>
+            <a:fld id="{36A212DA-347D-4853-A3E5-DB8AA592974E}" type="slidenum">
+              <a:rPr lang="fr-FR" smtClean="0"/>
+              <a:t>6</a:t>
+            </a:fld>
+            <a:endParaRPr lang="fr-FR"/>
           </a:p>
         </p:txBody>
       </p:sp>
     </p:spTree>
     <p:extLst>
       <p:ext uri="{BB962C8B-B14F-4D97-AF65-F5344CB8AC3E}">
-        <p14:creationId xmlns:p14="http://schemas.microsoft.com/office/powerpoint/2010/main" val="2463252761"/>
+        <p14:creationId xmlns:p14="http://schemas.microsoft.com/office/powerpoint/2010/main" val="1223733745"/>
       </p:ext>
     </p:extLst>
   </p:cSld>
@@ -5191,8 +7011,16 @@
           <a:lstStyle/>
           <a:p>
             <a:r>
-              <a:rPr lang="fr-FR" dirty="0" smtClean="0"/>
-              <a:t>Exposé du Problème : les données existent indéfiniment</a:t>
+              <a:rPr lang="fr-FR" dirty="0"/>
+              <a:t>Introduction aux DHT </a:t>
+            </a:r>
+            <a:r>
+              <a:rPr lang="fr-FR" dirty="0" smtClean="0"/>
+              <a:t>(2/2</a:t>
+            </a:r>
+            <a:r>
+              <a:rPr lang="fr-FR" dirty="0"/>
+              <a:t>)</a:t>
             </a:r>
             <a:endParaRPr lang="fr-FR" dirty="0"/>
           </a:p>
@@ -5200,27 +7028,213 @@
       </p:sp>
       <p:sp>
         <p:nvSpPr>
-          <p:cNvPr id="3" name="Espace réservé du texte 2"/>
-          <p:cNvSpPr>
-            <a:spLocks noGrp="1"/>
-          </p:cNvSpPr>
-          <p:nvPr>
-            <p:ph type="body" idx="1"/>
-          </p:nvPr>
-        </p:nvSpPr>
-        <p:spPr/>
-        <p:txBody>
-          <a:bodyPr/>
-          <a:lstStyle/>
-          <a:p>
+          <p:cNvPr id="3" name="Espace réservé du contenu 2"/>
+          <p:cNvSpPr>
+            <a:spLocks noGrp="1"/>
+          </p:cNvSpPr>
+          <p:nvPr>
+            <p:ph idx="1"/>
+          </p:nvPr>
+        </p:nvSpPr>
+        <p:spPr/>
+        <p:txBody>
+          <a:bodyPr>
+            <a:normAutofit/>
+          </a:bodyPr>
+          <a:lstStyle/>
+          <a:p>
+            <a:r>
+              <a:rPr lang="fr-FR" dirty="0"/>
+              <a:t>R</a:t>
+            </a:r>
+            <a:r>
+              <a:rPr lang="fr-FR" dirty="0" smtClean="0"/>
+              <a:t>éplication des données</a:t>
+            </a:r>
+          </a:p>
+          <a:p>
+            <a:pPr lvl="1"/>
+            <a:r>
+              <a:rPr lang="fr-FR" dirty="0" smtClean="0"/>
+              <a:t>Très </a:t>
+            </a:r>
+            <a:r>
+              <a:rPr lang="fr-FR" dirty="0" smtClean="0"/>
+              <a:t>robuste par rapport à la disparition des </a:t>
+            </a:r>
+            <a:r>
+              <a:rPr lang="fr-FR" dirty="0" smtClean="0"/>
+              <a:t>nœuds</a:t>
+            </a:r>
+          </a:p>
+          <a:p>
+            <a:pPr lvl="1"/>
+            <a:r>
+              <a:rPr lang="fr-FR" dirty="0" smtClean="0"/>
+              <a:t>La donnée reste disponible le temps ou elle doit l’être</a:t>
+            </a:r>
+            <a:endParaRPr lang="fr-FR" dirty="0" smtClean="0"/>
+          </a:p>
+          <a:p>
+            <a:pPr marL="457200" lvl="1" indent="0">
+              <a:buNone/>
+            </a:pPr>
             <a:endParaRPr lang="fr-FR" dirty="0"/>
           </a:p>
-        </p:txBody>
-      </p:sp>
+          <a:p>
+            <a:r>
+              <a:rPr lang="fr-FR" dirty="0" err="1" smtClean="0"/>
+              <a:t>Churn</a:t>
+            </a:r>
+            <a:endParaRPr lang="fr-FR" dirty="0"/>
+          </a:p>
+          <a:p>
+            <a:pPr lvl="1"/>
+            <a:r>
+              <a:rPr lang="fr-FR" dirty="0" smtClean="0"/>
+              <a:t>Propriété antagoniste</a:t>
+            </a:r>
+          </a:p>
+          <a:p>
+            <a:pPr lvl="1"/>
+            <a:r>
+              <a:rPr lang="fr-FR" dirty="0" smtClean="0"/>
+              <a:t>Les nœuds va-et-viennent sur le réseau</a:t>
+            </a:r>
+          </a:p>
+          <a:p>
+            <a:pPr lvl="1"/>
+            <a:r>
+              <a:rPr lang="fr-FR" dirty="0" smtClean="0"/>
+              <a:t>Inéluctable disparition de données</a:t>
+            </a:r>
+            <a:endParaRPr lang="fr-FR" dirty="0" smtClean="0"/>
+          </a:p>
+          <a:p>
+            <a:pPr lvl="1"/>
+            <a:endParaRPr lang="fr-FR" dirty="0"/>
+          </a:p>
+        </p:txBody>
+      </p:sp>
+      <p:sp>
+        <p:nvSpPr>
+          <p:cNvPr id="4" name="ZoneTexte 3"/>
+          <p:cNvSpPr txBox="1"/>
+          <p:nvPr/>
+        </p:nvSpPr>
+        <p:spPr>
+          <a:xfrm>
+            <a:off x="0" y="0"/>
+            <a:ext cx="4944752" cy="369332"/>
+          </a:xfrm>
+          <a:prstGeom prst="rect">
+            <a:avLst/>
+          </a:prstGeom>
+          <a:noFill/>
+        </p:spPr>
+        <p:txBody>
+          <a:bodyPr wrap="none" rtlCol="0">
+            <a:spAutoFit/>
+          </a:bodyPr>
+          <a:lstStyle/>
+          <a:p>
+            <a:r>
+              <a:rPr lang="fr-FR" dirty="0" smtClean="0"/>
+              <a:t>Exposé du problème -&gt; </a:t>
+            </a:r>
+            <a:r>
+              <a:rPr lang="fr-FR" b="1" dirty="0" smtClean="0"/>
+              <a:t>Solution</a:t>
+            </a:r>
+            <a:r>
+              <a:rPr lang="fr-FR" dirty="0" smtClean="0"/>
+              <a:t> -&gt; Notre approche</a:t>
+            </a:r>
+            <a:endParaRPr lang="fr-FR" dirty="0"/>
+          </a:p>
+        </p:txBody>
+      </p:sp>
+      <p:sp>
+        <p:nvSpPr>
+          <p:cNvPr id="6" name="Espace réservé du numéro de diapositive 5"/>
+          <p:cNvSpPr>
+            <a:spLocks noGrp="1"/>
+          </p:cNvSpPr>
+          <p:nvPr>
+            <p:ph type="sldNum" sz="quarter" idx="12"/>
+          </p:nvPr>
+        </p:nvSpPr>
+        <p:spPr/>
+        <p:txBody>
+          <a:bodyPr/>
+          <a:lstStyle/>
+          <a:p>
+            <a:fld id="{36A212DA-347D-4853-A3E5-DB8AA592974E}" type="slidenum">
+              <a:rPr lang="fr-FR" smtClean="0"/>
+              <a:t>7</a:t>
+            </a:fld>
+            <a:endParaRPr lang="fr-FR"/>
+          </a:p>
+        </p:txBody>
+      </p:sp>
+      <p:pic>
+        <p:nvPicPr>
+          <p:cNvPr id="1026" name="Picture 2" descr="http://i.ytimg.com/vi/b7fzkB-Om3k/mqdefault.jpg"/>
+          <p:cNvPicPr>
+            <a:picLocks noChangeAspect="1" noChangeArrowheads="1"/>
+          </p:cNvPicPr>
+          <p:nvPr/>
+        </p:nvPicPr>
+        <p:blipFill>
+          <a:blip r:embed="rId3">
+            <a:extLst>
+              <a:ext uri="{28A0092B-C50C-407E-A947-70E740481C1C}">
+                <a14:useLocalDpi xmlns:a14="http://schemas.microsoft.com/office/drawing/2010/main" val="0"/>
+              </a:ext>
+            </a:extLst>
+          </a:blip>
+          <a:srcRect/>
+          <a:stretch>
+            <a:fillRect/>
+          </a:stretch>
+        </p:blipFill>
+        <p:spPr bwMode="auto">
+          <a:xfrm>
+            <a:off x="7165152" y="3820848"/>
+            <a:ext cx="4188648" cy="2356115"/>
+          </a:xfrm>
+          <a:prstGeom prst="rect">
+            <a:avLst/>
+          </a:prstGeom>
+          <a:ln w="38100" cap="sq">
+            <a:solidFill>
+              <a:srgbClr val="000000"/>
+            </a:solidFill>
+            <a:prstDash val="solid"/>
+            <a:miter lim="800000"/>
+          </a:ln>
+          <a:effectLst>
+            <a:outerShdw blurRad="50800" dist="38100" dir="2700000" algn="tl" rotWithShape="0">
+              <a:srgbClr val="000000">
+                <a:alpha val="43000"/>
+              </a:srgbClr>
+            </a:outerShdw>
+          </a:effectLst>
+          <a:extLst>
+            <a:ext uri="{909E8E84-426E-40DD-AFC4-6F175D3DCCD1}">
+              <a14:hiddenFill xmlns:a14="http://schemas.microsoft.com/office/drawing/2010/main">
+                <a:solidFill>
+                  <a:srgbClr val="FFFFFF"/>
+                </a:solidFill>
+              </a14:hiddenFill>
+            </a:ext>
+          </a:extLst>
+        </p:spPr>
+      </p:pic>
     </p:spTree>
     <p:extLst>
       <p:ext uri="{BB962C8B-B14F-4D97-AF65-F5344CB8AC3E}">
-        <p14:creationId xmlns:p14="http://schemas.microsoft.com/office/powerpoint/2010/main" val="3856150891"/>
+        <p14:creationId xmlns:p14="http://schemas.microsoft.com/office/powerpoint/2010/main" val="124277756"/>
       </p:ext>
     </p:extLst>
   </p:cSld>
@@ -5264,7 +7278,7 @@
           <a:p>
             <a:r>
               <a:rPr lang="fr-FR" dirty="0" smtClean="0"/>
-              <a:t>Impossible de détruire des données</a:t>
+              <a:t>Quelques exemples</a:t>
             </a:r>
             <a:endParaRPr lang="fr-FR" dirty="0"/>
           </a:p>
@@ -5288,51 +7302,173 @@
           <a:lstStyle/>
           <a:p>
             <a:r>
-              <a:rPr lang="fr-FR" dirty="0" smtClean="0"/>
-              <a:t>Aucune incitation</a:t>
-            </a:r>
+              <a:rPr lang="fr-FR" dirty="0" err="1" smtClean="0">
+                <a:solidFill>
+                  <a:srgbClr val="FF0000"/>
+                </a:solidFill>
+              </a:rPr>
+              <a:t>Chord</a:t>
+            </a:r>
+            <a:endParaRPr lang="fr-FR" dirty="0" smtClean="0">
+              <a:solidFill>
+                <a:srgbClr val="FF0000"/>
+              </a:solidFill>
+            </a:endParaRPr>
           </a:p>
           <a:p>
             <a:pPr lvl="1"/>
             <a:r>
-              <a:rPr lang="fr-FR" dirty="0" smtClean="0"/>
-              <a:t>La capacité de stockage disponible est illimitée</a:t>
+              <a:rPr lang="fr-FR" dirty="0" smtClean="0">
+                <a:solidFill>
+                  <a:srgbClr val="FF0000"/>
+                </a:solidFill>
+              </a:rPr>
+              <a:t>L’espace de clés est un cercle</a:t>
             </a:r>
           </a:p>
           <a:p>
             <a:pPr lvl="1"/>
             <a:r>
-              <a:rPr lang="fr-FR" dirty="0" smtClean="0"/>
-              <a:t>De nombreux « services » veulent miner la valeur contenue dans les données</a:t>
-            </a:r>
-          </a:p>
-          <a:p>
-            <a:pPr lvl="1"/>
+              <a:rPr lang="fr-FR" dirty="0" smtClean="0">
+                <a:solidFill>
+                  <a:srgbClr val="FF0000"/>
+                </a:solidFill>
+              </a:rPr>
+              <a:t>Chaque nœud connaît n </a:t>
+            </a:r>
+            <a:r>
+              <a:rPr lang="fr-FR" smtClean="0">
+                <a:solidFill>
+                  <a:srgbClr val="FF0000"/>
+                </a:solidFill>
+              </a:rPr>
+              <a:t>autre nœuds </a:t>
+            </a:r>
+            <a:endParaRPr lang="fr-FR" dirty="0" smtClean="0">
+              <a:solidFill>
+                <a:srgbClr val="FF0000"/>
+              </a:solidFill>
+            </a:endParaRPr>
+          </a:p>
+          <a:p>
+            <a:endParaRPr lang="fr-FR" dirty="0" smtClean="0">
+              <a:solidFill>
+                <a:srgbClr val="FF0000"/>
+              </a:solidFill>
+            </a:endParaRPr>
+          </a:p>
+          <a:p>
+            <a:endParaRPr lang="fr-FR" dirty="0">
+              <a:solidFill>
+                <a:srgbClr val="FF0000"/>
+              </a:solidFill>
+            </a:endParaRPr>
+          </a:p>
+          <a:p>
+            <a:endParaRPr lang="fr-FR" dirty="0" smtClean="0">
+              <a:solidFill>
+                <a:srgbClr val="FF0000"/>
+              </a:solidFill>
+            </a:endParaRPr>
+          </a:p>
+          <a:p>
+            <a:r>
+              <a:rPr lang="fr-FR" dirty="0" smtClean="0">
+                <a:solidFill>
+                  <a:srgbClr val="FF0000"/>
+                </a:solidFill>
+              </a:rPr>
+              <a:t>Intuition </a:t>
+            </a:r>
+            <a:r>
+              <a:rPr lang="fr-FR" dirty="0" smtClean="0">
+                <a:solidFill>
+                  <a:srgbClr val="FF0000"/>
+                </a:solidFill>
+              </a:rPr>
+              <a:t>sur d’autres </a:t>
+            </a:r>
+            <a:r>
+              <a:rPr lang="fr-FR" dirty="0" smtClean="0">
+                <a:solidFill>
+                  <a:srgbClr val="FF0000"/>
+                </a:solidFill>
+              </a:rPr>
+              <a:t>principes (distances, etc.)</a:t>
+            </a:r>
+            <a:endParaRPr lang="fr-FR" dirty="0" smtClean="0">
+              <a:solidFill>
+                <a:srgbClr val="FF0000"/>
+              </a:solidFill>
+            </a:endParaRPr>
+          </a:p>
+        </p:txBody>
+      </p:sp>
+      <p:sp>
+        <p:nvSpPr>
+          <p:cNvPr id="4" name="ZoneTexte 3"/>
+          <p:cNvSpPr txBox="1"/>
+          <p:nvPr/>
+        </p:nvSpPr>
+        <p:spPr>
+          <a:xfrm>
+            <a:off x="0" y="0"/>
+            <a:ext cx="4944752" cy="369332"/>
+          </a:xfrm>
+          <a:prstGeom prst="rect">
+            <a:avLst/>
+          </a:prstGeom>
+          <a:noFill/>
+        </p:spPr>
+        <p:txBody>
+          <a:bodyPr wrap="none" rtlCol="0">
+            <a:spAutoFit/>
+          </a:bodyPr>
+          <a:lstStyle/>
+          <a:p>
+            <a:r>
+              <a:rPr lang="fr-FR" dirty="0" smtClean="0"/>
+              <a:t>Exposé du problème -&gt; </a:t>
+            </a:r>
+            <a:r>
+              <a:rPr lang="fr-FR" b="1" dirty="0" smtClean="0"/>
+              <a:t>Solution</a:t>
+            </a:r>
+            <a:r>
+              <a:rPr lang="fr-FR" dirty="0" smtClean="0"/>
+              <a:t> -&gt; Notre approche</a:t>
+            </a:r>
             <a:endParaRPr lang="fr-FR" dirty="0"/>
           </a:p>
-          <a:p>
-            <a:r>
-              <a:rPr lang="fr-FR" dirty="0" smtClean="0"/>
-              <a:t>Aucune responsabilité</a:t>
-            </a:r>
-          </a:p>
-          <a:p>
-            <a:pPr lvl="1"/>
-            <a:r>
-              <a:rPr lang="fr-FR" dirty="0" smtClean="0"/>
-              <a:t>Les utilisateurs ont abandonné le contrôle sur leur données</a:t>
-            </a:r>
-          </a:p>
-          <a:p>
-            <a:pPr lvl="1"/>
-            <a:endParaRPr lang="fr-FR" dirty="0"/>
+        </p:txBody>
+      </p:sp>
+      <p:sp>
+        <p:nvSpPr>
+          <p:cNvPr id="6" name="Espace réservé du numéro de diapositive 5"/>
+          <p:cNvSpPr>
+            <a:spLocks noGrp="1"/>
+          </p:cNvSpPr>
+          <p:nvPr>
+            <p:ph type="sldNum" sz="quarter" idx="12"/>
+          </p:nvPr>
+        </p:nvSpPr>
+        <p:spPr/>
+        <p:txBody>
+          <a:bodyPr/>
+          <a:lstStyle/>
+          <a:p>
+            <a:fld id="{36A212DA-347D-4853-A3E5-DB8AA592974E}" type="slidenum">
+              <a:rPr lang="fr-FR" smtClean="0"/>
+              <a:t>8</a:t>
+            </a:fld>
+            <a:endParaRPr lang="fr-FR"/>
           </a:p>
         </p:txBody>
       </p:sp>
     </p:spTree>
     <p:extLst>
       <p:ext uri="{BB962C8B-B14F-4D97-AF65-F5344CB8AC3E}">
-        <p14:creationId xmlns:p14="http://schemas.microsoft.com/office/powerpoint/2010/main" val="1677475312"/>
+        <p14:creationId xmlns:p14="http://schemas.microsoft.com/office/powerpoint/2010/main" val="2517551255"/>
       </p:ext>
     </p:extLst>
   </p:cSld>
@@ -5376,7 +7512,11 @@
           <a:p>
             <a:r>
               <a:rPr lang="fr-FR" dirty="0" smtClean="0"/>
-              <a:t>Attaque rétroactive</a:t>
+              <a:t>DHT : Application à la </a:t>
+            </a:r>
+            <a:r>
+              <a:rPr lang="fr-FR" dirty="0" smtClean="0"/>
+              <a:t>publication éphémère</a:t>
             </a:r>
             <a:endParaRPr lang="fr-FR" dirty="0"/>
           </a:p>
@@ -5395,67 +7535,154 @@
         <p:spPr/>
         <p:txBody>
           <a:bodyPr>
-            <a:normAutofit/>
+            <a:normAutofit lnSpcReduction="10000"/>
           </a:bodyPr>
           <a:lstStyle/>
           <a:p>
             <a:r>
               <a:rPr lang="fr-FR" dirty="0" smtClean="0"/>
-              <a:t>Des données peuvent ressurgir des mois voir des années après leur supposé effacement</a:t>
-            </a:r>
+              <a:t>Principe</a:t>
+            </a:r>
+            <a:endParaRPr lang="fr-FR" dirty="0" smtClean="0"/>
           </a:p>
           <a:p>
             <a:pPr lvl="1"/>
             <a:r>
               <a:rPr lang="fr-FR" dirty="0" smtClean="0"/>
-              <a:t>Où sont les copies d’un mail ? </a:t>
+              <a:t>Fragmentation et dissémination : l</a:t>
+            </a:r>
+            <a:r>
+              <a:rPr lang="fr-FR" dirty="0" smtClean="0"/>
+              <a:t>es </a:t>
+            </a:r>
+            <a:r>
+              <a:rPr lang="fr-FR" dirty="0" smtClean="0"/>
+              <a:t>morceaux de clé sont envoyés sur la DHT</a:t>
+            </a:r>
+          </a:p>
+          <a:p>
+            <a:pPr lvl="1"/>
+            <a:r>
+              <a:rPr lang="fr-FR" dirty="0" smtClean="0"/>
+              <a:t>Sont transmis aux utilisateurs légitimes :</a:t>
+            </a:r>
+          </a:p>
+          <a:p>
+            <a:pPr lvl="2"/>
+            <a:r>
+              <a:rPr lang="fr-FR" dirty="0" smtClean="0"/>
+              <a:t>Une clé de localisation pour retrouver ces morceaux</a:t>
+            </a:r>
+          </a:p>
+          <a:p>
+            <a:pPr lvl="2"/>
+            <a:r>
+              <a:rPr lang="fr-FR" dirty="0" smtClean="0"/>
+              <a:t>Les données chiffrées</a:t>
+            </a:r>
+          </a:p>
+          <a:p>
+            <a:endParaRPr lang="fr-FR" dirty="0"/>
+          </a:p>
+          <a:p>
+            <a:r>
+              <a:rPr lang="fr-FR" dirty="0" smtClean="0"/>
+              <a:t>Conclusion : avec le </a:t>
             </a:r>
             <a:r>
               <a:rPr lang="fr-FR" dirty="0" err="1" smtClean="0"/>
-              <a:t>Ont-elles</a:t>
-            </a:r>
-            <a:r>
-              <a:rPr lang="fr-FR" dirty="0" smtClean="0"/>
-              <a:t> toutes été effacées ?</a:t>
-            </a:r>
-          </a:p>
-          <a:p>
-            <a:pPr lvl="1"/>
-            <a:r>
-              <a:rPr lang="fr-FR" dirty="0" smtClean="0"/>
-              <a:t>La destruction d’un compte Facebook n’entraîne pas celle des données</a:t>
+              <a:t>churn</a:t>
+            </a:r>
+            <a:r>
+              <a:rPr lang="fr-FR" dirty="0" smtClean="0"/>
+              <a:t>, impossible de récupérer la donnée initiale après un certain temps</a:t>
+            </a:r>
+            <a:r>
+              <a:rPr lang="fr-FR" dirty="0" smtClean="0"/>
+              <a:t>.</a:t>
+            </a:r>
+          </a:p>
+          <a:p>
+            <a:endParaRPr lang="fr-FR" dirty="0"/>
+          </a:p>
+          <a:p>
+            <a:r>
+              <a:rPr lang="fr-FR" dirty="0" smtClean="0"/>
+              <a:t>Une implémentation : </a:t>
+            </a:r>
+            <a:r>
+              <a:rPr lang="fr-FR" dirty="0" err="1" smtClean="0"/>
+              <a:t>Vanish</a:t>
             </a:r>
             <a:endParaRPr lang="fr-FR" dirty="0" smtClean="0"/>
           </a:p>
-          <a:p>
+        </p:txBody>
+      </p:sp>
+      <p:sp>
+        <p:nvSpPr>
+          <p:cNvPr id="4" name="ZoneTexte 3"/>
+          <p:cNvSpPr txBox="1"/>
+          <p:nvPr/>
+        </p:nvSpPr>
+        <p:spPr>
+          <a:xfrm>
+            <a:off x="0" y="0"/>
+            <a:ext cx="4944752" cy="369332"/>
+          </a:xfrm>
+          <a:prstGeom prst="rect">
+            <a:avLst/>
+          </a:prstGeom>
+          <a:noFill/>
+        </p:spPr>
+        <p:txBody>
+          <a:bodyPr wrap="none" rtlCol="0">
+            <a:spAutoFit/>
+          </a:bodyPr>
+          <a:lstStyle/>
+          <a:p>
+            <a:r>
+              <a:rPr lang="fr-FR" dirty="0" smtClean="0"/>
+              <a:t>Exposé du problème -&gt; </a:t>
+            </a:r>
+            <a:r>
+              <a:rPr lang="fr-FR" b="1" dirty="0" smtClean="0"/>
+              <a:t>Solution</a:t>
+            </a:r>
+            <a:r>
+              <a:rPr lang="fr-FR" dirty="0" smtClean="0"/>
+              <a:t> -&gt; Notre approche</a:t>
+            </a:r>
             <a:endParaRPr lang="fr-FR" dirty="0"/>
           </a:p>
-          <a:p>
-            <a:r>
-              <a:rPr lang="fr-FR" dirty="0" smtClean="0"/>
-              <a:t>Comment faire ?</a:t>
-            </a:r>
-          </a:p>
-          <a:p>
-            <a:pPr lvl="1"/>
-            <a:r>
-              <a:rPr lang="fr-FR" dirty="0" smtClean="0"/>
-              <a:t>Pas de service centralisé</a:t>
-            </a:r>
-          </a:p>
-          <a:p>
-            <a:pPr lvl="1"/>
-            <a:r>
-              <a:rPr lang="fr-FR" dirty="0" smtClean="0"/>
-              <a:t>Pas de chiffrement : la justice peut demander les clés</a:t>
-            </a:r>
+        </p:txBody>
+      </p:sp>
+      <p:sp>
+        <p:nvSpPr>
+          <p:cNvPr id="6" name="Espace réservé du numéro de diapositive 5"/>
+          <p:cNvSpPr>
+            <a:spLocks noGrp="1"/>
+          </p:cNvSpPr>
+          <p:nvPr>
+            <p:ph type="sldNum" sz="quarter" idx="12"/>
+          </p:nvPr>
+        </p:nvSpPr>
+        <p:spPr/>
+        <p:txBody>
+          <a:bodyPr/>
+          <a:lstStyle/>
+          <a:p>
+            <a:fld id="{36A212DA-347D-4853-A3E5-DB8AA592974E}" type="slidenum">
+              <a:rPr lang="fr-FR" smtClean="0"/>
+              <a:t>9</a:t>
+            </a:fld>
+            <a:endParaRPr lang="fr-FR"/>
           </a:p>
         </p:txBody>
       </p:sp>
     </p:spTree>
     <p:extLst>
       <p:ext uri="{BB962C8B-B14F-4D97-AF65-F5344CB8AC3E}">
-        <p14:creationId xmlns:p14="http://schemas.microsoft.com/office/powerpoint/2010/main" val="1723849266"/>
+        <p14:creationId xmlns:p14="http://schemas.microsoft.com/office/powerpoint/2010/main" val="1410180187"/>
       </p:ext>
     </p:extLst>
   </p:cSld>

</xml_diff>